<commit_message>
Working on HTML form slides.
</commit_message>
<xml_diff>
--- a/unit_00/html_review/01 HTML.pptx
+++ b/unit_00/html_review/01 HTML.pptx
@@ -5,7 +5,7 @@
     <p:sldMasterId id="2147483673" r:id="rId4"/>
   </p:sldMasterIdLst>
   <p:notesMasterIdLst>
-    <p:notesMasterId r:id="rId33"/>
+    <p:notesMasterId r:id="rId34"/>
   </p:notesMasterIdLst>
   <p:sldIdLst>
     <p:sldId id="257" r:id="rId5"/>
@@ -34,8 +34,9 @@
     <p:sldId id="284" r:id="rId28"/>
     <p:sldId id="279" r:id="rId29"/>
     <p:sldId id="285" r:id="rId30"/>
-    <p:sldId id="280" r:id="rId31"/>
-    <p:sldId id="277" r:id="rId32"/>
+    <p:sldId id="292" r:id="rId31"/>
+    <p:sldId id="280" r:id="rId32"/>
+    <p:sldId id="277" r:id="rId33"/>
   </p:sldIdLst>
   <p:sldSz cx="12192000" cy="6858000"/>
   <p:notesSz cx="6858000" cy="9144000"/>
@@ -736,7 +737,7 @@
           <a:p>
             <a:fld id="{913AAEB1-1BB9-43BA-8E44-621D6A53A2EE}" type="slidenum">
               <a:rPr lang="en-US" smtClean="0"/>
-              <a:t>28</a:t>
+              <a:t>29</a:t>
             </a:fld>
             <a:endParaRPr lang="en-US"/>
           </a:p>
@@ -9103,7 +9104,7 @@
                 <a:latin typeface="Consolas" panose="020B0609020204030204" pitchFamily="49" charset="0"/>
                 <a:cs typeface="Arial" panose="020B0604020202020204" pitchFamily="34" charset="0"/>
               </a:rPr>
-              <a:t>&lt;form action="contactme.html" method="POST/GET"&gt;…&lt;/form&gt;</a:t>
+              <a:t>&lt;form action="contact_me.html" method="POST/GET"&gt;…&lt;/form&gt;</a:t>
             </a:r>
           </a:p>
           <a:p>
@@ -10244,10 +10245,10 @@
       </p:grpSpPr>
       <p:sp>
         <p:nvSpPr>
-          <p:cNvPr id="2" name="Title 1">
+          <p:cNvPr id="5" name="Title 4">
             <a:extLst>
               <a:ext uri="{FF2B5EF4-FFF2-40B4-BE49-F238E27FC236}">
-                <a16:creationId xmlns:a16="http://schemas.microsoft.com/office/drawing/2014/main" id="{BDFAC13C-59B1-436E-B58F-C304E1C705CF}"/>
+                <a16:creationId xmlns:a16="http://schemas.microsoft.com/office/drawing/2014/main" id="{19920336-7909-426F-8081-AFA24B193F14}"/>
               </a:ext>
             </a:extLst>
           </p:cNvPr>
@@ -10260,24 +10261,22 @@
         </p:nvSpPr>
         <p:spPr/>
         <p:txBody>
-          <a:bodyPr>
-            <a:normAutofit/>
-          </a:bodyPr>
-          <a:lstStyle/>
-          <a:p>
-            <a:r>
-              <a:rPr lang="en-US" u="sng" dirty="0"/>
-              <a:t>What We Covered</a:t>
-            </a:r>
-          </a:p>
-        </p:txBody>
-      </p:sp>
-      <p:sp>
-        <p:nvSpPr>
-          <p:cNvPr id="3" name="Content Placeholder 2">
+          <a:bodyPr/>
+          <a:lstStyle/>
+          <a:p>
+            <a:r>
+              <a:rPr lang="en-US" cap="none"/>
+              <a:t>Conclusion</a:t>
+            </a:r>
+          </a:p>
+        </p:txBody>
+      </p:sp>
+      <p:sp>
+        <p:nvSpPr>
+          <p:cNvPr id="6" name="Text Placeholder 5">
             <a:extLst>
               <a:ext uri="{FF2B5EF4-FFF2-40B4-BE49-F238E27FC236}">
-                <a16:creationId xmlns:a16="http://schemas.microsoft.com/office/drawing/2014/main" id="{844A3DC5-46BF-4BFF-8008-98FD467C4904}"/>
+                <a16:creationId xmlns:a16="http://schemas.microsoft.com/office/drawing/2014/main" id="{DAE3D404-51E4-4D64-88D7-AFA22CFBA8F7}"/>
               </a:ext>
             </a:extLst>
           </p:cNvPr>
@@ -10285,55 +10284,30 @@
             <a:spLocks noGrp="1"/>
           </p:cNvSpPr>
           <p:nvPr>
-            <p:ph idx="1"/>
+            <p:ph type="body" idx="1"/>
           </p:nvPr>
         </p:nvSpPr>
         <p:spPr/>
         <p:txBody>
-          <a:bodyPr>
-            <a:normAutofit/>
-          </a:bodyPr>
-          <a:lstStyle/>
-          <a:p>
-            <a:r>
-              <a:rPr lang="en-US" sz="1800">
-                <a:cs typeface="Arial" panose="020B0604020202020204" pitchFamily="34" charset="0"/>
-              </a:rPr>
-              <a:t>Review HTML Document Structure</a:t>
-            </a:r>
-          </a:p>
-          <a:p>
-            <a:r>
-              <a:rPr lang="en-US" sz="1800">
-                <a:cs typeface="Arial" panose="020B0604020202020204" pitchFamily="34" charset="0"/>
-              </a:rPr>
-              <a:t>Review &lt;head&gt; section tags</a:t>
-            </a:r>
-          </a:p>
-          <a:p>
-            <a:r>
-              <a:rPr lang="en-US" sz="1800">
-                <a:cs typeface="Arial" panose="020B0604020202020204" pitchFamily="34" charset="0"/>
-              </a:rPr>
-              <a:t>Review &lt;body&gt; section tags</a:t>
-            </a:r>
-          </a:p>
-          <a:p>
-            <a:r>
-              <a:rPr lang="en-US" sz="1800">
-                <a:cs typeface="Arial" panose="020B0604020202020204" pitchFamily="34" charset="0"/>
-              </a:rPr>
-              <a:t>Introduction to HTML Forms</a:t>
-            </a:r>
-            <a:endParaRPr lang="en-US" sz="1800" dirty="0">
-              <a:cs typeface="Arial" panose="020B0604020202020204" pitchFamily="34" charset="0"/>
-            </a:endParaRPr>
-          </a:p>
-        </p:txBody>
-      </p:sp>
-      <p:sp>
-        <p:nvSpPr>
-          <p:cNvPr id="5" name="Slide Number Placeholder 4"/>
+          <a:bodyPr/>
+          <a:lstStyle/>
+          <a:p>
+            <a:r>
+              <a:rPr lang="en-US"/>
+              <a:t>What did we learn today?</a:t>
+            </a:r>
+          </a:p>
+        </p:txBody>
+      </p:sp>
+      <p:sp>
+        <p:nvSpPr>
+          <p:cNvPr id="4" name="Slide Number Placeholder 3">
+            <a:extLst>
+              <a:ext uri="{FF2B5EF4-FFF2-40B4-BE49-F238E27FC236}">
+                <a16:creationId xmlns:a16="http://schemas.microsoft.com/office/drawing/2014/main" id="{B3E58610-8DF0-4BC8-B28F-9775BE8BC83F}"/>
+              </a:ext>
+            </a:extLst>
+          </p:cNvPr>
           <p:cNvSpPr>
             <a:spLocks noGrp="1"/>
           </p:cNvSpPr>
@@ -10357,7 +10331,7 @@
     </p:spTree>
     <p:extLst>
       <p:ext uri="{BB962C8B-B14F-4D97-AF65-F5344CB8AC3E}">
-        <p14:creationId xmlns:p14="http://schemas.microsoft.com/office/powerpoint/2010/main" val="2820098090"/>
+        <p14:creationId xmlns:p14="http://schemas.microsoft.com/office/powerpoint/2010/main" val="1909237733"/>
       </p:ext>
     </p:extLst>
   </p:cSld>
@@ -10400,6 +10374,148 @@
             <p:ph type="title"/>
           </p:nvPr>
         </p:nvSpPr>
+        <p:spPr/>
+        <p:txBody>
+          <a:bodyPr>
+            <a:normAutofit/>
+          </a:bodyPr>
+          <a:lstStyle/>
+          <a:p>
+            <a:r>
+              <a:rPr lang="en-US" u="sng" dirty="0"/>
+              <a:t>What We Covered</a:t>
+            </a:r>
+          </a:p>
+        </p:txBody>
+      </p:sp>
+      <p:sp>
+        <p:nvSpPr>
+          <p:cNvPr id="3" name="Content Placeholder 2">
+            <a:extLst>
+              <a:ext uri="{FF2B5EF4-FFF2-40B4-BE49-F238E27FC236}">
+                <a16:creationId xmlns:a16="http://schemas.microsoft.com/office/drawing/2014/main" id="{844A3DC5-46BF-4BFF-8008-98FD467C4904}"/>
+              </a:ext>
+            </a:extLst>
+          </p:cNvPr>
+          <p:cNvSpPr>
+            <a:spLocks noGrp="1"/>
+          </p:cNvSpPr>
+          <p:nvPr>
+            <p:ph idx="1"/>
+          </p:nvPr>
+        </p:nvSpPr>
+        <p:spPr/>
+        <p:txBody>
+          <a:bodyPr>
+            <a:normAutofit/>
+          </a:bodyPr>
+          <a:lstStyle/>
+          <a:p>
+            <a:r>
+              <a:rPr lang="en-US" sz="1800">
+                <a:cs typeface="Arial" panose="020B0604020202020204" pitchFamily="34" charset="0"/>
+              </a:rPr>
+              <a:t>Review HTML Document Structure</a:t>
+            </a:r>
+          </a:p>
+          <a:p>
+            <a:r>
+              <a:rPr lang="en-US" sz="1800">
+                <a:cs typeface="Arial" panose="020B0604020202020204" pitchFamily="34" charset="0"/>
+              </a:rPr>
+              <a:t>Review &lt;head&gt; section tags</a:t>
+            </a:r>
+          </a:p>
+          <a:p>
+            <a:r>
+              <a:rPr lang="en-US" sz="1800">
+                <a:cs typeface="Arial" panose="020B0604020202020204" pitchFamily="34" charset="0"/>
+              </a:rPr>
+              <a:t>Review &lt;body&gt; section tags</a:t>
+            </a:r>
+          </a:p>
+          <a:p>
+            <a:r>
+              <a:rPr lang="en-US" sz="1800">
+                <a:cs typeface="Arial" panose="020B0604020202020204" pitchFamily="34" charset="0"/>
+              </a:rPr>
+              <a:t>Introduction to HTML Forms</a:t>
+            </a:r>
+            <a:endParaRPr lang="en-US" sz="1800" dirty="0">
+              <a:cs typeface="Arial" panose="020B0604020202020204" pitchFamily="34" charset="0"/>
+            </a:endParaRPr>
+          </a:p>
+        </p:txBody>
+      </p:sp>
+      <p:sp>
+        <p:nvSpPr>
+          <p:cNvPr id="5" name="Slide Number Placeholder 4"/>
+          <p:cNvSpPr>
+            <a:spLocks noGrp="1"/>
+          </p:cNvSpPr>
+          <p:nvPr>
+            <p:ph type="sldNum" sz="quarter" idx="12"/>
+          </p:nvPr>
+        </p:nvSpPr>
+        <p:spPr/>
+        <p:txBody>
+          <a:bodyPr/>
+          <a:lstStyle/>
+          <a:p>
+            <a:fld id="{34B7E4EF-A1BD-40F4-AB7B-04F084DD991D}" type="slidenum">
+              <a:rPr lang="en-US" smtClean="0"/>
+              <a:t>28</a:t>
+            </a:fld>
+            <a:endParaRPr lang="en-US" dirty="0"/>
+          </a:p>
+        </p:txBody>
+      </p:sp>
+    </p:spTree>
+    <p:extLst>
+      <p:ext uri="{BB962C8B-B14F-4D97-AF65-F5344CB8AC3E}">
+        <p14:creationId xmlns:p14="http://schemas.microsoft.com/office/powerpoint/2010/main" val="2820098090"/>
+      </p:ext>
+    </p:extLst>
+  </p:cSld>
+  <p:clrMapOvr>
+    <a:masterClrMapping/>
+  </p:clrMapOvr>
+</p:sld>
+</file>
+
+<file path=ppt/slides/slide29.xml><?xml version="1.0" encoding="utf-8"?>
+<p:sld xmlns:a="http://schemas.openxmlformats.org/drawingml/2006/main" xmlns:r="http://schemas.openxmlformats.org/officeDocument/2006/relationships" xmlns:p="http://schemas.openxmlformats.org/presentationml/2006/main">
+  <p:cSld>
+    <p:spTree>
+      <p:nvGrpSpPr>
+        <p:cNvPr id="1" name=""/>
+        <p:cNvGrpSpPr/>
+        <p:nvPr/>
+      </p:nvGrpSpPr>
+      <p:grpSpPr>
+        <a:xfrm>
+          <a:off x="0" y="0"/>
+          <a:ext cx="0" cy="0"/>
+          <a:chOff x="0" y="0"/>
+          <a:chExt cx="0" cy="0"/>
+        </a:xfrm>
+      </p:grpSpPr>
+      <p:sp>
+        <p:nvSpPr>
+          <p:cNvPr id="2" name="Title 1">
+            <a:extLst>
+              <a:ext uri="{FF2B5EF4-FFF2-40B4-BE49-F238E27FC236}">
+                <a16:creationId xmlns:a16="http://schemas.microsoft.com/office/drawing/2014/main" id="{BDFAC13C-59B1-436E-B58F-C304E1C705CF}"/>
+              </a:ext>
+            </a:extLst>
+          </p:cNvPr>
+          <p:cNvSpPr>
+            <a:spLocks noGrp="1"/>
+          </p:cNvSpPr>
+          <p:nvPr>
+            <p:ph type="title"/>
+          </p:nvPr>
+        </p:nvSpPr>
         <p:spPr>
           <a:xfrm>
             <a:off x="664234" y="733579"/>
@@ -10523,7 +10639,7 @@
           <a:p>
             <a:fld id="{34B7E4EF-A1BD-40F4-AB7B-04F084DD991D}" type="slidenum">
               <a:rPr lang="en-US" smtClean="0"/>
-              <a:t>28</a:t>
+              <a:t>29</a:t>
             </a:fld>
             <a:endParaRPr lang="en-US" dirty="0"/>
           </a:p>
@@ -12814,6 +12930,15 @@
 </file>
 
 <file path=customXml/item1.xml><?xml version="1.0" encoding="utf-8"?>
+<?mso-contentType ?>
+<FormTemplates xmlns="http://schemas.microsoft.com/sharepoint/v3/contenttype/forms">
+  <Display>DocumentLibraryForm</Display>
+  <Edit>DocumentLibraryForm</Edit>
+  <New>DocumentLibraryForm</New>
+</FormTemplates>
+</file>
+
+<file path=customXml/item2.xml><?xml version="1.0" encoding="utf-8"?>
 <ct:contentTypeSchema xmlns:ct="http://schemas.microsoft.com/office/2006/metadata/contentType" xmlns:ma="http://schemas.microsoft.com/office/2006/metadata/properties/metaAttributes" ct:_="" ma:_="" ma:contentTypeName="Document" ma:contentTypeID="0x01010079F111ED35F8CC479449609E8A0923A6" ma:contentTypeVersion="12" ma:contentTypeDescription="Create a new document." ma:contentTypeScope="" ma:versionID="a410dd7f93c95333ffa1b60ed6adedd1">
   <xsd:schema xmlns:xsd="http://www.w3.org/2001/XMLSchema" xmlns:xs="http://www.w3.org/2001/XMLSchema" xmlns:p="http://schemas.microsoft.com/office/2006/metadata/properties" xmlns:ns2="71af3243-3dd4-4a8d-8c0d-dd76da1f02a5" xmlns:ns3="16c05727-aa75-4e4a-9b5f-8a80a1165891" targetNamespace="http://schemas.microsoft.com/office/2006/metadata/properties" ma:root="true" ma:fieldsID="a936d9baba76aa3866493feff160faab" ns2:_="" ns3:_="">
     <xsd:import namespace="71af3243-3dd4-4a8d-8c0d-dd76da1f02a5"/>
@@ -13034,15 +13159,6 @@
 </ct:contentTypeSchema>
 </file>
 
-<file path=customXml/item2.xml><?xml version="1.0" encoding="utf-8"?>
-<?mso-contentType ?>
-<FormTemplates xmlns="http://schemas.microsoft.com/sharepoint/v3/contenttype/forms">
-  <Display>DocumentLibraryForm</Display>
-  <Edit>DocumentLibraryForm</Edit>
-  <New>DocumentLibraryForm</New>
-</FormTemplates>
-</file>
-
 <file path=customXml/item3.xml><?xml version="1.0" encoding="utf-8"?>
 <p:properties xmlns:p="http://schemas.microsoft.com/office/2006/metadata/properties" xmlns:xsi="http://www.w3.org/2001/XMLSchema-instance" xmlns:pc="http://schemas.microsoft.com/office/infopath/2007/PartnerControls">
   <documentManagement>
@@ -13053,6 +13169,14 @@
 </file>
 
 <file path=customXml/itemProps1.xml><?xml version="1.0" encoding="utf-8"?>
+<ds:datastoreItem xmlns:ds="http://schemas.openxmlformats.org/officeDocument/2006/customXml" ds:itemID="{CDB58277-F8DF-46FF-84EC-EF41B835E69F}">
+  <ds:schemaRefs>
+    <ds:schemaRef ds:uri="http://schemas.microsoft.com/sharepoint/v3/contenttype/forms"/>
+  </ds:schemaRefs>
+</ds:datastoreItem>
+</file>
+
+<file path=customXml/itemProps2.xml><?xml version="1.0" encoding="utf-8"?>
 <ds:datastoreItem xmlns:ds="http://schemas.openxmlformats.org/officeDocument/2006/customXml" ds:itemID="{2D276E62-80A3-44DD-9BCC-97ED2B99B57F}">
   <ds:schemaRefs>
     <ds:schemaRef ds:uri="http://schemas.microsoft.com/office/2006/metadata/contentType"/>
@@ -13067,14 +13191,6 @@
     <ds:schemaRef ds:uri="http://purl.org/dc/elements/1.1/"/>
     <ds:schemaRef ds:uri="http://purl.org/dc/terms/"/>
     <ds:schemaRef ds:uri="http://schemas.microsoft.com/internal/obd"/>
-  </ds:schemaRefs>
-</ds:datastoreItem>
-</file>
-
-<file path=customXml/itemProps2.xml><?xml version="1.0" encoding="utf-8"?>
-<ds:datastoreItem xmlns:ds="http://schemas.openxmlformats.org/officeDocument/2006/customXml" ds:itemID="{CDB58277-F8DF-46FF-84EC-EF41B835E69F}">
-  <ds:schemaRefs>
-    <ds:schemaRef ds:uri="http://schemas.microsoft.com/sharepoint/v3/contenttype/forms"/>
   </ds:schemaRefs>
 </ds:datastoreItem>
 </file>

</xml_diff>

<commit_message>
Adding sources for block and inline elements
</commit_message>
<xml_diff>
--- a/unit_00/html_review/01 HTML.pptx
+++ b/unit_00/html_review/01 HTML.pptx
@@ -225,7 +225,7 @@
           <a:p>
             <a:fld id="{3F839238-B565-4611-A910-43B731DECEC1}" type="datetimeFigureOut">
               <a:rPr lang="en-US" smtClean="0"/>
-              <a:t>7/28/2020</a:t>
+              <a:t>7/29/2020</a:t>
             </a:fld>
             <a:endParaRPr lang="en-US"/>
           </a:p>
@@ -536,6 +536,252 @@
           <a:bodyPr/>
           <a:lstStyle/>
           <a:p>
+            <a:pPr marL="0" marR="0" lvl="0" indent="0" algn="l" defTabSz="914400" rtl="0" eaLnBrk="1" fontAlgn="auto" latinLnBrk="0" hangingPunct="1">
+              <a:lnSpc>
+                <a:spcPct val="100000"/>
+              </a:lnSpc>
+              <a:spcBef>
+                <a:spcPts val="0"/>
+              </a:spcBef>
+              <a:spcAft>
+                <a:spcPts val="0"/>
+              </a:spcAft>
+              <a:buClrTx/>
+              <a:buSzTx/>
+              <a:buFontTx/>
+              <a:buNone/>
+              <a:tabLst/>
+              <a:defRPr/>
+            </a:pPr>
+            <a:r>
+              <a:rPr lang="en-US">
+                <a:solidFill>
+                  <a:srgbClr val="00B0F0"/>
+                </a:solidFill>
+                <a:hlinkClick r:id="rId3">
+                  <a:extLst>
+                    <a:ext uri="{A12FA001-AC4F-418D-AE19-62706E023703}">
+                      <ahyp:hlinkClr xmlns:ahyp="http://schemas.microsoft.com/office/drawing/2018/hyperlinkcolor" val="tx"/>
+                    </a:ext>
+                  </a:extLst>
+                </a:hlinkClick>
+              </a:rPr>
+              <a:t>https://developer.mozilla.org/en-US/docs/Glossary/HTML</a:t>
+            </a:r>
+            <a:endParaRPr lang="en-US">
+              <a:solidFill>
+                <a:srgbClr val="00B0F0"/>
+              </a:solidFill>
+            </a:endParaRPr>
+          </a:p>
+          <a:p>
+            <a:endParaRPr lang="en-US"/>
+          </a:p>
+        </p:txBody>
+      </p:sp>
+      <p:sp>
+        <p:nvSpPr>
+          <p:cNvPr id="4" name="Slide Number Placeholder 3"/>
+          <p:cNvSpPr>
+            <a:spLocks noGrp="1"/>
+          </p:cNvSpPr>
+          <p:nvPr>
+            <p:ph type="sldNum" sz="quarter" idx="5"/>
+          </p:nvPr>
+        </p:nvSpPr>
+        <p:spPr/>
+        <p:txBody>
+          <a:bodyPr/>
+          <a:lstStyle/>
+          <a:p>
+            <a:fld id="{913AAEB1-1BB9-43BA-8E44-621D6A53A2EE}" type="slidenum">
+              <a:rPr lang="en-US" smtClean="0"/>
+              <a:t>3</a:t>
+            </a:fld>
+            <a:endParaRPr lang="en-US"/>
+          </a:p>
+        </p:txBody>
+      </p:sp>
+    </p:spTree>
+    <p:extLst>
+      <p:ext uri="{BB962C8B-B14F-4D97-AF65-F5344CB8AC3E}">
+        <p14:creationId xmlns:p14="http://schemas.microsoft.com/office/powerpoint/2010/main" val="2760112768"/>
+      </p:ext>
+    </p:extLst>
+  </p:cSld>
+  <p:clrMapOvr>
+    <a:masterClrMapping/>
+  </p:clrMapOvr>
+</p:notes>
+</file>
+
+<file path=ppt/notesSlides/notesSlide10.xml><?xml version="1.0" encoding="utf-8"?>
+<p:notes xmlns:a="http://schemas.openxmlformats.org/drawingml/2006/main" xmlns:r="http://schemas.openxmlformats.org/officeDocument/2006/relationships" xmlns:p="http://schemas.openxmlformats.org/presentationml/2006/main">
+  <p:cSld>
+    <p:spTree>
+      <p:nvGrpSpPr>
+        <p:cNvPr id="1" name=""/>
+        <p:cNvGrpSpPr/>
+        <p:nvPr/>
+      </p:nvGrpSpPr>
+      <p:grpSpPr>
+        <a:xfrm>
+          <a:off x="0" y="0"/>
+          <a:ext cx="0" cy="0"/>
+          <a:chOff x="0" y="0"/>
+          <a:chExt cx="0" cy="0"/>
+        </a:xfrm>
+      </p:grpSpPr>
+      <p:sp>
+        <p:nvSpPr>
+          <p:cNvPr id="2" name="Slide Image Placeholder 1"/>
+          <p:cNvSpPr>
+            <a:spLocks noGrp="1" noRot="1" noChangeAspect="1"/>
+          </p:cNvSpPr>
+          <p:nvPr>
+            <p:ph type="sldImg"/>
+          </p:nvPr>
+        </p:nvSpPr>
+        <p:spPr/>
+      </p:sp>
+      <p:sp>
+        <p:nvSpPr>
+          <p:cNvPr id="3" name="Notes Placeholder 2"/>
+          <p:cNvSpPr>
+            <a:spLocks noGrp="1"/>
+          </p:cNvSpPr>
+          <p:nvPr>
+            <p:ph type="body" idx="1"/>
+          </p:nvPr>
+        </p:nvSpPr>
+        <p:spPr/>
+        <p:txBody>
+          <a:bodyPr/>
+          <a:lstStyle/>
+          <a:p>
+            <a:pPr marL="0" marR="0" lvl="0" indent="0" algn="l" defTabSz="914400" rtl="0" eaLnBrk="1" fontAlgn="auto" latinLnBrk="0" hangingPunct="1">
+              <a:lnSpc>
+                <a:spcPct val="100000"/>
+              </a:lnSpc>
+              <a:spcBef>
+                <a:spcPts val="0"/>
+              </a:spcBef>
+              <a:spcAft>
+                <a:spcPts val="0"/>
+              </a:spcAft>
+              <a:buClrTx/>
+              <a:buSzTx/>
+              <a:buFontTx/>
+              <a:buNone/>
+              <a:tabLst/>
+              <a:defRPr/>
+            </a:pPr>
+            <a:r>
+              <a:rPr lang="en-US">
+                <a:solidFill>
+                  <a:srgbClr val="00B0F0"/>
+                </a:solidFill>
+                <a:hlinkClick r:id="rId3">
+                  <a:extLst>
+                    <a:ext uri="{A12FA001-AC4F-418D-AE19-62706E023703}">
+                      <ahyp:hlinkClr xmlns:ahyp="http://schemas.microsoft.com/office/drawing/2018/hyperlinkcolor" val="tx"/>
+                    </a:ext>
+                  </a:extLst>
+                </a:hlinkClick>
+              </a:rPr>
+              <a:t>https://developer.mozilla.org/en-US/docs/Web/HTML/Element/span</a:t>
+            </a:r>
+            <a:endParaRPr lang="en-US">
+              <a:solidFill>
+                <a:srgbClr val="00B0F0"/>
+              </a:solidFill>
+            </a:endParaRPr>
+          </a:p>
+          <a:p>
+            <a:endParaRPr lang="en-US"/>
+          </a:p>
+        </p:txBody>
+      </p:sp>
+      <p:sp>
+        <p:nvSpPr>
+          <p:cNvPr id="4" name="Slide Number Placeholder 3"/>
+          <p:cNvSpPr>
+            <a:spLocks noGrp="1"/>
+          </p:cNvSpPr>
+          <p:nvPr>
+            <p:ph type="sldNum" sz="quarter" idx="5"/>
+          </p:nvPr>
+        </p:nvSpPr>
+        <p:spPr/>
+        <p:txBody>
+          <a:bodyPr/>
+          <a:lstStyle/>
+          <a:p>
+            <a:fld id="{913AAEB1-1BB9-43BA-8E44-621D6A53A2EE}" type="slidenum">
+              <a:rPr lang="en-US" smtClean="0"/>
+              <a:t>15</a:t>
+            </a:fld>
+            <a:endParaRPr lang="en-US"/>
+          </a:p>
+        </p:txBody>
+      </p:sp>
+    </p:spTree>
+    <p:extLst>
+      <p:ext uri="{BB962C8B-B14F-4D97-AF65-F5344CB8AC3E}">
+        <p14:creationId xmlns:p14="http://schemas.microsoft.com/office/powerpoint/2010/main" val="648810010"/>
+      </p:ext>
+    </p:extLst>
+  </p:cSld>
+  <p:clrMapOvr>
+    <a:masterClrMapping/>
+  </p:clrMapOvr>
+</p:notes>
+</file>
+
+<file path=ppt/notesSlides/notesSlide11.xml><?xml version="1.0" encoding="utf-8"?>
+<p:notes xmlns:a="http://schemas.openxmlformats.org/drawingml/2006/main" xmlns:r="http://schemas.openxmlformats.org/officeDocument/2006/relationships" xmlns:p="http://schemas.openxmlformats.org/presentationml/2006/main">
+  <p:cSld>
+    <p:spTree>
+      <p:nvGrpSpPr>
+        <p:cNvPr id="1" name=""/>
+        <p:cNvGrpSpPr/>
+        <p:nvPr/>
+      </p:nvGrpSpPr>
+      <p:grpSpPr>
+        <a:xfrm>
+          <a:off x="0" y="0"/>
+          <a:ext cx="0" cy="0"/>
+          <a:chOff x="0" y="0"/>
+          <a:chExt cx="0" cy="0"/>
+        </a:xfrm>
+      </p:grpSpPr>
+      <p:sp>
+        <p:nvSpPr>
+          <p:cNvPr id="2" name="Slide Image Placeholder 1"/>
+          <p:cNvSpPr>
+            <a:spLocks noGrp="1" noRot="1" noChangeAspect="1"/>
+          </p:cNvSpPr>
+          <p:nvPr>
+            <p:ph type="sldImg"/>
+          </p:nvPr>
+        </p:nvSpPr>
+        <p:spPr/>
+      </p:sp>
+      <p:sp>
+        <p:nvSpPr>
+          <p:cNvPr id="3" name="Notes Placeholder 2"/>
+          <p:cNvSpPr>
+            <a:spLocks noGrp="1"/>
+          </p:cNvSpPr>
+          <p:nvPr>
+            <p:ph type="body" idx="1"/>
+          </p:nvPr>
+        </p:nvSpPr>
+        <p:spPr/>
+        <p:txBody>
+          <a:bodyPr/>
+          <a:lstStyle/>
+          <a:p>
             <a:r>
               <a:rPr lang="en-US">
                 <a:hlinkClick r:id="rId3"/>
@@ -573,6 +819,795 @@
     <p:extLst>
       <p:ext uri="{BB962C8B-B14F-4D97-AF65-F5344CB8AC3E}">
         <p14:creationId xmlns:p14="http://schemas.microsoft.com/office/powerpoint/2010/main" val="322264101"/>
+      </p:ext>
+    </p:extLst>
+  </p:cSld>
+  <p:clrMapOvr>
+    <a:masterClrMapping/>
+  </p:clrMapOvr>
+</p:notes>
+</file>
+
+<file path=ppt/notesSlides/notesSlide12.xml><?xml version="1.0" encoding="utf-8"?>
+<p:notes xmlns:a="http://schemas.openxmlformats.org/drawingml/2006/main" xmlns:r="http://schemas.openxmlformats.org/officeDocument/2006/relationships" xmlns:p="http://schemas.openxmlformats.org/presentationml/2006/main">
+  <p:cSld>
+    <p:spTree>
+      <p:nvGrpSpPr>
+        <p:cNvPr id="1" name=""/>
+        <p:cNvGrpSpPr/>
+        <p:nvPr/>
+      </p:nvGrpSpPr>
+      <p:grpSpPr>
+        <a:xfrm>
+          <a:off x="0" y="0"/>
+          <a:ext cx="0" cy="0"/>
+          <a:chOff x="0" y="0"/>
+          <a:chExt cx="0" cy="0"/>
+        </a:xfrm>
+      </p:grpSpPr>
+      <p:sp>
+        <p:nvSpPr>
+          <p:cNvPr id="2" name="Slide Image Placeholder 1"/>
+          <p:cNvSpPr>
+            <a:spLocks noGrp="1" noRot="1" noChangeAspect="1"/>
+          </p:cNvSpPr>
+          <p:nvPr>
+            <p:ph type="sldImg"/>
+          </p:nvPr>
+        </p:nvSpPr>
+        <p:spPr/>
+      </p:sp>
+      <p:sp>
+        <p:nvSpPr>
+          <p:cNvPr id="3" name="Notes Placeholder 2"/>
+          <p:cNvSpPr>
+            <a:spLocks noGrp="1"/>
+          </p:cNvSpPr>
+          <p:nvPr>
+            <p:ph type="body" idx="1"/>
+          </p:nvPr>
+        </p:nvSpPr>
+        <p:spPr/>
+        <p:txBody>
+          <a:bodyPr/>
+          <a:lstStyle/>
+          <a:p>
+            <a:r>
+              <a:rPr lang="en-US">
+                <a:hlinkClick r:id="rId3"/>
+              </a:rPr>
+              <a:t>https://developer.mozilla.org/en-US/docs/Web/HTML/Inline_elements</a:t>
+            </a:r>
+            <a:endParaRPr lang="en-US"/>
+          </a:p>
+        </p:txBody>
+      </p:sp>
+      <p:sp>
+        <p:nvSpPr>
+          <p:cNvPr id="4" name="Slide Number Placeholder 3"/>
+          <p:cNvSpPr>
+            <a:spLocks noGrp="1"/>
+          </p:cNvSpPr>
+          <p:nvPr>
+            <p:ph type="sldNum" sz="quarter" idx="5"/>
+          </p:nvPr>
+        </p:nvSpPr>
+        <p:spPr/>
+        <p:txBody>
+          <a:bodyPr/>
+          <a:lstStyle/>
+          <a:p>
+            <a:fld id="{913AAEB1-1BB9-43BA-8E44-621D6A53A2EE}" type="slidenum">
+              <a:rPr lang="en-US" smtClean="0"/>
+              <a:t>17</a:t>
+            </a:fld>
+            <a:endParaRPr lang="en-US"/>
+          </a:p>
+        </p:txBody>
+      </p:sp>
+    </p:spTree>
+    <p:extLst>
+      <p:ext uri="{BB962C8B-B14F-4D97-AF65-F5344CB8AC3E}">
+        <p14:creationId xmlns:p14="http://schemas.microsoft.com/office/powerpoint/2010/main" val="1069080471"/>
+      </p:ext>
+    </p:extLst>
+  </p:cSld>
+  <p:clrMapOvr>
+    <a:masterClrMapping/>
+  </p:clrMapOvr>
+</p:notes>
+</file>
+
+<file path=ppt/notesSlides/notesSlide13.xml><?xml version="1.0" encoding="utf-8"?>
+<p:notes xmlns:a="http://schemas.openxmlformats.org/drawingml/2006/main" xmlns:r="http://schemas.openxmlformats.org/officeDocument/2006/relationships" xmlns:p="http://schemas.openxmlformats.org/presentationml/2006/main">
+  <p:cSld>
+    <p:spTree>
+      <p:nvGrpSpPr>
+        <p:cNvPr id="1" name=""/>
+        <p:cNvGrpSpPr/>
+        <p:nvPr/>
+      </p:nvGrpSpPr>
+      <p:grpSpPr>
+        <a:xfrm>
+          <a:off x="0" y="0"/>
+          <a:ext cx="0" cy="0"/>
+          <a:chOff x="0" y="0"/>
+          <a:chExt cx="0" cy="0"/>
+        </a:xfrm>
+      </p:grpSpPr>
+      <p:sp>
+        <p:nvSpPr>
+          <p:cNvPr id="2" name="Slide Image Placeholder 1"/>
+          <p:cNvSpPr>
+            <a:spLocks noGrp="1" noRot="1" noChangeAspect="1"/>
+          </p:cNvSpPr>
+          <p:nvPr>
+            <p:ph type="sldImg"/>
+          </p:nvPr>
+        </p:nvSpPr>
+        <p:spPr/>
+      </p:sp>
+      <p:sp>
+        <p:nvSpPr>
+          <p:cNvPr id="3" name="Notes Placeholder 2"/>
+          <p:cNvSpPr>
+            <a:spLocks noGrp="1"/>
+          </p:cNvSpPr>
+          <p:nvPr>
+            <p:ph type="body" idx="1"/>
+          </p:nvPr>
+        </p:nvSpPr>
+        <p:spPr/>
+        <p:txBody>
+          <a:bodyPr/>
+          <a:lstStyle/>
+          <a:p>
+            <a:pPr marL="0" marR="0" lvl="0" indent="0" algn="l" defTabSz="914400" rtl="0" eaLnBrk="1" fontAlgn="auto" latinLnBrk="0" hangingPunct="1">
+              <a:lnSpc>
+                <a:spcPct val="100000"/>
+              </a:lnSpc>
+              <a:spcBef>
+                <a:spcPts val="0"/>
+              </a:spcBef>
+              <a:spcAft>
+                <a:spcPts val="0"/>
+              </a:spcAft>
+              <a:buClrTx/>
+              <a:buSzTx/>
+              <a:buFontTx/>
+              <a:buNone/>
+              <a:tabLst/>
+              <a:defRPr/>
+            </a:pPr>
+            <a:r>
+              <a:rPr lang="en-US">
+                <a:solidFill>
+                  <a:srgbClr val="00B0F0"/>
+                </a:solidFill>
+                <a:hlinkClick r:id="rId3">
+                  <a:extLst>
+                    <a:ext uri="{A12FA001-AC4F-418D-AE19-62706E023703}">
+                      <ahyp:hlinkClr xmlns:ahyp="http://schemas.microsoft.com/office/drawing/2018/hyperlinkcolor" val="tx"/>
+                    </a:ext>
+                  </a:extLst>
+                </a:hlinkClick>
+              </a:rPr>
+              <a:t>https://developer.mozilla.org/en-US/docs/Web/HTML/Element/Heading_Elements</a:t>
+            </a:r>
+            <a:endParaRPr lang="en-US">
+              <a:solidFill>
+                <a:srgbClr val="00B0F0"/>
+              </a:solidFill>
+            </a:endParaRPr>
+          </a:p>
+          <a:p>
+            <a:endParaRPr lang="en-US"/>
+          </a:p>
+        </p:txBody>
+      </p:sp>
+      <p:sp>
+        <p:nvSpPr>
+          <p:cNvPr id="4" name="Slide Number Placeholder 3"/>
+          <p:cNvSpPr>
+            <a:spLocks noGrp="1"/>
+          </p:cNvSpPr>
+          <p:nvPr>
+            <p:ph type="sldNum" sz="quarter" idx="5"/>
+          </p:nvPr>
+        </p:nvSpPr>
+        <p:spPr/>
+        <p:txBody>
+          <a:bodyPr/>
+          <a:lstStyle/>
+          <a:p>
+            <a:fld id="{913AAEB1-1BB9-43BA-8E44-621D6A53A2EE}" type="slidenum">
+              <a:rPr lang="en-US" smtClean="0"/>
+              <a:t>18</a:t>
+            </a:fld>
+            <a:endParaRPr lang="en-US"/>
+          </a:p>
+        </p:txBody>
+      </p:sp>
+    </p:spTree>
+    <p:extLst>
+      <p:ext uri="{BB962C8B-B14F-4D97-AF65-F5344CB8AC3E}">
+        <p14:creationId xmlns:p14="http://schemas.microsoft.com/office/powerpoint/2010/main" val="4099384988"/>
+      </p:ext>
+    </p:extLst>
+  </p:cSld>
+  <p:clrMapOvr>
+    <a:masterClrMapping/>
+  </p:clrMapOvr>
+</p:notes>
+</file>
+
+<file path=ppt/notesSlides/notesSlide14.xml><?xml version="1.0" encoding="utf-8"?>
+<p:notes xmlns:a="http://schemas.openxmlformats.org/drawingml/2006/main" xmlns:r="http://schemas.openxmlformats.org/officeDocument/2006/relationships" xmlns:p="http://schemas.openxmlformats.org/presentationml/2006/main">
+  <p:cSld>
+    <p:spTree>
+      <p:nvGrpSpPr>
+        <p:cNvPr id="1" name=""/>
+        <p:cNvGrpSpPr/>
+        <p:nvPr/>
+      </p:nvGrpSpPr>
+      <p:grpSpPr>
+        <a:xfrm>
+          <a:off x="0" y="0"/>
+          <a:ext cx="0" cy="0"/>
+          <a:chOff x="0" y="0"/>
+          <a:chExt cx="0" cy="0"/>
+        </a:xfrm>
+      </p:grpSpPr>
+      <p:sp>
+        <p:nvSpPr>
+          <p:cNvPr id="2" name="Slide Image Placeholder 1"/>
+          <p:cNvSpPr>
+            <a:spLocks noGrp="1" noRot="1" noChangeAspect="1"/>
+          </p:cNvSpPr>
+          <p:nvPr>
+            <p:ph type="sldImg"/>
+          </p:nvPr>
+        </p:nvSpPr>
+        <p:spPr/>
+      </p:sp>
+      <p:sp>
+        <p:nvSpPr>
+          <p:cNvPr id="3" name="Notes Placeholder 2"/>
+          <p:cNvSpPr>
+            <a:spLocks noGrp="1"/>
+          </p:cNvSpPr>
+          <p:nvPr>
+            <p:ph type="body" idx="1"/>
+          </p:nvPr>
+        </p:nvSpPr>
+        <p:spPr/>
+        <p:txBody>
+          <a:bodyPr/>
+          <a:lstStyle/>
+          <a:p>
+            <a:pPr marL="0" marR="0" lvl="0" indent="0" algn="l" defTabSz="914400" rtl="0" eaLnBrk="1" fontAlgn="auto" latinLnBrk="0" hangingPunct="1">
+              <a:lnSpc>
+                <a:spcPct val="100000"/>
+              </a:lnSpc>
+              <a:spcBef>
+                <a:spcPts val="0"/>
+              </a:spcBef>
+              <a:spcAft>
+                <a:spcPts val="0"/>
+              </a:spcAft>
+              <a:buClrTx/>
+              <a:buSzTx/>
+              <a:buFontTx/>
+              <a:buNone/>
+              <a:tabLst/>
+              <a:defRPr/>
+            </a:pPr>
+            <a:r>
+              <a:rPr lang="en-US">
+                <a:solidFill>
+                  <a:srgbClr val="00B0F0"/>
+                </a:solidFill>
+                <a:hlinkClick r:id="rId3">
+                  <a:extLst>
+                    <a:ext uri="{A12FA001-AC4F-418D-AE19-62706E023703}">
+                      <ahyp:hlinkClr xmlns:ahyp="http://schemas.microsoft.com/office/drawing/2018/hyperlinkcolor" val="tx"/>
+                    </a:ext>
+                  </a:extLst>
+                </a:hlinkClick>
+              </a:rPr>
+              <a:t>https://developer.mozilla.org/en-US/docs/Web/HTML/Element/p</a:t>
+            </a:r>
+            <a:endParaRPr lang="en-US" b="1">
+              <a:solidFill>
+                <a:srgbClr val="00B0F0"/>
+              </a:solidFill>
+            </a:endParaRPr>
+          </a:p>
+          <a:p>
+            <a:endParaRPr lang="en-US"/>
+          </a:p>
+        </p:txBody>
+      </p:sp>
+      <p:sp>
+        <p:nvSpPr>
+          <p:cNvPr id="4" name="Slide Number Placeholder 3"/>
+          <p:cNvSpPr>
+            <a:spLocks noGrp="1"/>
+          </p:cNvSpPr>
+          <p:nvPr>
+            <p:ph type="sldNum" sz="quarter" idx="5"/>
+          </p:nvPr>
+        </p:nvSpPr>
+        <p:spPr/>
+        <p:txBody>
+          <a:bodyPr/>
+          <a:lstStyle/>
+          <a:p>
+            <a:fld id="{913AAEB1-1BB9-43BA-8E44-621D6A53A2EE}" type="slidenum">
+              <a:rPr lang="en-US" smtClean="0"/>
+              <a:t>19</a:t>
+            </a:fld>
+            <a:endParaRPr lang="en-US"/>
+          </a:p>
+        </p:txBody>
+      </p:sp>
+    </p:spTree>
+    <p:extLst>
+      <p:ext uri="{BB962C8B-B14F-4D97-AF65-F5344CB8AC3E}">
+        <p14:creationId xmlns:p14="http://schemas.microsoft.com/office/powerpoint/2010/main" val="310755420"/>
+      </p:ext>
+    </p:extLst>
+  </p:cSld>
+  <p:clrMapOvr>
+    <a:masterClrMapping/>
+  </p:clrMapOvr>
+</p:notes>
+</file>
+
+<file path=ppt/notesSlides/notesSlide15.xml><?xml version="1.0" encoding="utf-8"?>
+<p:notes xmlns:a="http://schemas.openxmlformats.org/drawingml/2006/main" xmlns:r="http://schemas.openxmlformats.org/officeDocument/2006/relationships" xmlns:p="http://schemas.openxmlformats.org/presentationml/2006/main">
+  <p:cSld>
+    <p:spTree>
+      <p:nvGrpSpPr>
+        <p:cNvPr id="1" name=""/>
+        <p:cNvGrpSpPr/>
+        <p:nvPr/>
+      </p:nvGrpSpPr>
+      <p:grpSpPr>
+        <a:xfrm>
+          <a:off x="0" y="0"/>
+          <a:ext cx="0" cy="0"/>
+          <a:chOff x="0" y="0"/>
+          <a:chExt cx="0" cy="0"/>
+        </a:xfrm>
+      </p:grpSpPr>
+      <p:sp>
+        <p:nvSpPr>
+          <p:cNvPr id="2" name="Slide Image Placeholder 1"/>
+          <p:cNvSpPr>
+            <a:spLocks noGrp="1" noRot="1" noChangeAspect="1"/>
+          </p:cNvSpPr>
+          <p:nvPr>
+            <p:ph type="sldImg"/>
+          </p:nvPr>
+        </p:nvSpPr>
+        <p:spPr/>
+      </p:sp>
+      <p:sp>
+        <p:nvSpPr>
+          <p:cNvPr id="3" name="Notes Placeholder 2"/>
+          <p:cNvSpPr>
+            <a:spLocks noGrp="1"/>
+          </p:cNvSpPr>
+          <p:nvPr>
+            <p:ph type="body" idx="1"/>
+          </p:nvPr>
+        </p:nvSpPr>
+        <p:spPr/>
+        <p:txBody>
+          <a:bodyPr/>
+          <a:lstStyle/>
+          <a:p>
+            <a:pPr marL="0" marR="0" lvl="0" indent="0" algn="l" defTabSz="914400" rtl="0" eaLnBrk="1" fontAlgn="auto" latinLnBrk="0" hangingPunct="1">
+              <a:lnSpc>
+                <a:spcPct val="100000"/>
+              </a:lnSpc>
+              <a:spcBef>
+                <a:spcPts val="0"/>
+              </a:spcBef>
+              <a:spcAft>
+                <a:spcPts val="0"/>
+              </a:spcAft>
+              <a:buClrTx/>
+              <a:buSzTx/>
+              <a:buFontTx/>
+              <a:buNone/>
+              <a:tabLst/>
+              <a:defRPr/>
+            </a:pPr>
+            <a:r>
+              <a:rPr lang="en-US">
+                <a:solidFill>
+                  <a:srgbClr val="00B0F0"/>
+                </a:solidFill>
+                <a:hlinkClick r:id="rId3">
+                  <a:extLst>
+                    <a:ext uri="{A12FA001-AC4F-418D-AE19-62706E023703}">
+                      <ahyp:hlinkClr xmlns:ahyp="http://schemas.microsoft.com/office/drawing/2018/hyperlinkcolor" val="tx"/>
+                    </a:ext>
+                  </a:extLst>
+                </a:hlinkClick>
+              </a:rPr>
+              <a:t>https://developer.mozilla.org/en-US/docs/Web/HTML/Element/ol</a:t>
+            </a:r>
+            <a:endParaRPr lang="en-US">
+              <a:solidFill>
+                <a:srgbClr val="00B0F0"/>
+              </a:solidFill>
+            </a:endParaRPr>
+          </a:p>
+          <a:p>
+            <a:endParaRPr lang="en-US"/>
+          </a:p>
+        </p:txBody>
+      </p:sp>
+      <p:sp>
+        <p:nvSpPr>
+          <p:cNvPr id="4" name="Slide Number Placeholder 3"/>
+          <p:cNvSpPr>
+            <a:spLocks noGrp="1"/>
+          </p:cNvSpPr>
+          <p:nvPr>
+            <p:ph type="sldNum" sz="quarter" idx="5"/>
+          </p:nvPr>
+        </p:nvSpPr>
+        <p:spPr/>
+        <p:txBody>
+          <a:bodyPr/>
+          <a:lstStyle/>
+          <a:p>
+            <a:fld id="{913AAEB1-1BB9-43BA-8E44-621D6A53A2EE}" type="slidenum">
+              <a:rPr lang="en-US" smtClean="0"/>
+              <a:t>20</a:t>
+            </a:fld>
+            <a:endParaRPr lang="en-US"/>
+          </a:p>
+        </p:txBody>
+      </p:sp>
+    </p:spTree>
+    <p:extLst>
+      <p:ext uri="{BB962C8B-B14F-4D97-AF65-F5344CB8AC3E}">
+        <p14:creationId xmlns:p14="http://schemas.microsoft.com/office/powerpoint/2010/main" val="3254986036"/>
+      </p:ext>
+    </p:extLst>
+  </p:cSld>
+  <p:clrMapOvr>
+    <a:masterClrMapping/>
+  </p:clrMapOvr>
+</p:notes>
+</file>
+
+<file path=ppt/notesSlides/notesSlide16.xml><?xml version="1.0" encoding="utf-8"?>
+<p:notes xmlns:a="http://schemas.openxmlformats.org/drawingml/2006/main" xmlns:r="http://schemas.openxmlformats.org/officeDocument/2006/relationships" xmlns:p="http://schemas.openxmlformats.org/presentationml/2006/main">
+  <p:cSld>
+    <p:spTree>
+      <p:nvGrpSpPr>
+        <p:cNvPr id="1" name=""/>
+        <p:cNvGrpSpPr/>
+        <p:nvPr/>
+      </p:nvGrpSpPr>
+      <p:grpSpPr>
+        <a:xfrm>
+          <a:off x="0" y="0"/>
+          <a:ext cx="0" cy="0"/>
+          <a:chOff x="0" y="0"/>
+          <a:chExt cx="0" cy="0"/>
+        </a:xfrm>
+      </p:grpSpPr>
+      <p:sp>
+        <p:nvSpPr>
+          <p:cNvPr id="2" name="Slide Image Placeholder 1"/>
+          <p:cNvSpPr>
+            <a:spLocks noGrp="1" noRot="1" noChangeAspect="1"/>
+          </p:cNvSpPr>
+          <p:nvPr>
+            <p:ph type="sldImg"/>
+          </p:nvPr>
+        </p:nvSpPr>
+        <p:spPr/>
+      </p:sp>
+      <p:sp>
+        <p:nvSpPr>
+          <p:cNvPr id="3" name="Notes Placeholder 2"/>
+          <p:cNvSpPr>
+            <a:spLocks noGrp="1"/>
+          </p:cNvSpPr>
+          <p:nvPr>
+            <p:ph type="body" idx="1"/>
+          </p:nvPr>
+        </p:nvSpPr>
+        <p:spPr/>
+        <p:txBody>
+          <a:bodyPr/>
+          <a:lstStyle/>
+          <a:p>
+            <a:pPr marL="0" marR="0" lvl="0" indent="0" algn="l" defTabSz="914400" rtl="0" eaLnBrk="1" fontAlgn="auto" latinLnBrk="0" hangingPunct="1">
+              <a:lnSpc>
+                <a:spcPct val="100000"/>
+              </a:lnSpc>
+              <a:spcBef>
+                <a:spcPts val="0"/>
+              </a:spcBef>
+              <a:spcAft>
+                <a:spcPts val="0"/>
+              </a:spcAft>
+              <a:buClrTx/>
+              <a:buSzTx/>
+              <a:buFontTx/>
+              <a:buNone/>
+              <a:tabLst/>
+              <a:defRPr/>
+            </a:pPr>
+            <a:r>
+              <a:rPr lang="en-US">
+                <a:solidFill>
+                  <a:srgbClr val="00B0F0"/>
+                </a:solidFill>
+                <a:hlinkClick r:id="rId3">
+                  <a:extLst>
+                    <a:ext uri="{A12FA001-AC4F-418D-AE19-62706E023703}">
+                      <ahyp:hlinkClr xmlns:ahyp="http://schemas.microsoft.com/office/drawing/2018/hyperlinkcolor" val="tx"/>
+                    </a:ext>
+                  </a:extLst>
+                </a:hlinkClick>
+              </a:rPr>
+              <a:t>https://developer.mozilla.org/en-US/docs/Web/HTML/Element/ul</a:t>
+            </a:r>
+            <a:endParaRPr lang="en-US">
+              <a:solidFill>
+                <a:srgbClr val="00B0F0"/>
+              </a:solidFill>
+            </a:endParaRPr>
+          </a:p>
+          <a:p>
+            <a:endParaRPr lang="en-US"/>
+          </a:p>
+        </p:txBody>
+      </p:sp>
+      <p:sp>
+        <p:nvSpPr>
+          <p:cNvPr id="4" name="Slide Number Placeholder 3"/>
+          <p:cNvSpPr>
+            <a:spLocks noGrp="1"/>
+          </p:cNvSpPr>
+          <p:nvPr>
+            <p:ph type="sldNum" sz="quarter" idx="5"/>
+          </p:nvPr>
+        </p:nvSpPr>
+        <p:spPr/>
+        <p:txBody>
+          <a:bodyPr/>
+          <a:lstStyle/>
+          <a:p>
+            <a:fld id="{913AAEB1-1BB9-43BA-8E44-621D6A53A2EE}" type="slidenum">
+              <a:rPr lang="en-US" smtClean="0"/>
+              <a:t>21</a:t>
+            </a:fld>
+            <a:endParaRPr lang="en-US"/>
+          </a:p>
+        </p:txBody>
+      </p:sp>
+    </p:spTree>
+    <p:extLst>
+      <p:ext uri="{BB962C8B-B14F-4D97-AF65-F5344CB8AC3E}">
+        <p14:creationId xmlns:p14="http://schemas.microsoft.com/office/powerpoint/2010/main" val="1256548344"/>
+      </p:ext>
+    </p:extLst>
+  </p:cSld>
+  <p:clrMapOvr>
+    <a:masterClrMapping/>
+  </p:clrMapOvr>
+</p:notes>
+</file>
+
+<file path=ppt/notesSlides/notesSlide17.xml><?xml version="1.0" encoding="utf-8"?>
+<p:notes xmlns:a="http://schemas.openxmlformats.org/drawingml/2006/main" xmlns:r="http://schemas.openxmlformats.org/officeDocument/2006/relationships" xmlns:p="http://schemas.openxmlformats.org/presentationml/2006/main">
+  <p:cSld>
+    <p:spTree>
+      <p:nvGrpSpPr>
+        <p:cNvPr id="1" name=""/>
+        <p:cNvGrpSpPr/>
+        <p:nvPr/>
+      </p:nvGrpSpPr>
+      <p:grpSpPr>
+        <a:xfrm>
+          <a:off x="0" y="0"/>
+          <a:ext cx="0" cy="0"/>
+          <a:chOff x="0" y="0"/>
+          <a:chExt cx="0" cy="0"/>
+        </a:xfrm>
+      </p:grpSpPr>
+      <p:sp>
+        <p:nvSpPr>
+          <p:cNvPr id="2" name="Slide Image Placeholder 1"/>
+          <p:cNvSpPr>
+            <a:spLocks noGrp="1" noRot="1" noChangeAspect="1"/>
+          </p:cNvSpPr>
+          <p:nvPr>
+            <p:ph type="sldImg"/>
+          </p:nvPr>
+        </p:nvSpPr>
+        <p:spPr/>
+      </p:sp>
+      <p:sp>
+        <p:nvSpPr>
+          <p:cNvPr id="3" name="Notes Placeholder 2"/>
+          <p:cNvSpPr>
+            <a:spLocks noGrp="1"/>
+          </p:cNvSpPr>
+          <p:nvPr>
+            <p:ph type="body" idx="1"/>
+          </p:nvPr>
+        </p:nvSpPr>
+        <p:spPr/>
+        <p:txBody>
+          <a:bodyPr/>
+          <a:lstStyle/>
+          <a:p>
+            <a:pPr marL="0" marR="0" lvl="0" indent="0" algn="l" defTabSz="914400" rtl="0" eaLnBrk="1" fontAlgn="auto" latinLnBrk="0" hangingPunct="1">
+              <a:lnSpc>
+                <a:spcPct val="100000"/>
+              </a:lnSpc>
+              <a:spcBef>
+                <a:spcPts val="0"/>
+              </a:spcBef>
+              <a:spcAft>
+                <a:spcPts val="0"/>
+              </a:spcAft>
+              <a:buClrTx/>
+              <a:buSzTx/>
+              <a:buFontTx/>
+              <a:buNone/>
+              <a:tabLst/>
+              <a:defRPr/>
+            </a:pPr>
+            <a:r>
+              <a:rPr lang="en-US">
+                <a:solidFill>
+                  <a:srgbClr val="00B0F0"/>
+                </a:solidFill>
+                <a:hlinkClick r:id="rId3">
+                  <a:extLst>
+                    <a:ext uri="{A12FA001-AC4F-418D-AE19-62706E023703}">
+                      <ahyp:hlinkClr xmlns:ahyp="http://schemas.microsoft.com/office/drawing/2018/hyperlinkcolor" val="tx"/>
+                    </a:ext>
+                  </a:extLst>
+                </a:hlinkClick>
+              </a:rPr>
+              <a:t>https://developer.mozilla.org/en-US/docs/Web/HTML/Element/form</a:t>
+            </a:r>
+            <a:endParaRPr lang="en-US">
+              <a:solidFill>
+                <a:srgbClr val="00B0F0"/>
+              </a:solidFill>
+            </a:endParaRPr>
+          </a:p>
+          <a:p>
+            <a:endParaRPr lang="en-US"/>
+          </a:p>
+        </p:txBody>
+      </p:sp>
+      <p:sp>
+        <p:nvSpPr>
+          <p:cNvPr id="4" name="Slide Number Placeholder 3"/>
+          <p:cNvSpPr>
+            <a:spLocks noGrp="1"/>
+          </p:cNvSpPr>
+          <p:nvPr>
+            <p:ph type="sldNum" sz="quarter" idx="5"/>
+          </p:nvPr>
+        </p:nvSpPr>
+        <p:spPr/>
+        <p:txBody>
+          <a:bodyPr/>
+          <a:lstStyle/>
+          <a:p>
+            <a:fld id="{913AAEB1-1BB9-43BA-8E44-621D6A53A2EE}" type="slidenum">
+              <a:rPr lang="en-US" smtClean="0"/>
+              <a:t>23</a:t>
+            </a:fld>
+            <a:endParaRPr lang="en-US"/>
+          </a:p>
+        </p:txBody>
+      </p:sp>
+    </p:spTree>
+    <p:extLst>
+      <p:ext uri="{BB962C8B-B14F-4D97-AF65-F5344CB8AC3E}">
+        <p14:creationId xmlns:p14="http://schemas.microsoft.com/office/powerpoint/2010/main" val="2976847427"/>
+      </p:ext>
+    </p:extLst>
+  </p:cSld>
+  <p:clrMapOvr>
+    <a:masterClrMapping/>
+  </p:clrMapOvr>
+</p:notes>
+</file>
+
+<file path=ppt/notesSlides/notesSlide18.xml><?xml version="1.0" encoding="utf-8"?>
+<p:notes xmlns:a="http://schemas.openxmlformats.org/drawingml/2006/main" xmlns:r="http://schemas.openxmlformats.org/officeDocument/2006/relationships" xmlns:p="http://schemas.openxmlformats.org/presentationml/2006/main">
+  <p:cSld>
+    <p:spTree>
+      <p:nvGrpSpPr>
+        <p:cNvPr id="1" name=""/>
+        <p:cNvGrpSpPr/>
+        <p:nvPr/>
+      </p:nvGrpSpPr>
+      <p:grpSpPr>
+        <a:xfrm>
+          <a:off x="0" y="0"/>
+          <a:ext cx="0" cy="0"/>
+          <a:chOff x="0" y="0"/>
+          <a:chExt cx="0" cy="0"/>
+        </a:xfrm>
+      </p:grpSpPr>
+      <p:sp>
+        <p:nvSpPr>
+          <p:cNvPr id="2" name="Slide Image Placeholder 1"/>
+          <p:cNvSpPr>
+            <a:spLocks noGrp="1" noRot="1" noChangeAspect="1"/>
+          </p:cNvSpPr>
+          <p:nvPr>
+            <p:ph type="sldImg"/>
+          </p:nvPr>
+        </p:nvSpPr>
+        <p:spPr/>
+      </p:sp>
+      <p:sp>
+        <p:nvSpPr>
+          <p:cNvPr id="3" name="Notes Placeholder 2"/>
+          <p:cNvSpPr>
+            <a:spLocks noGrp="1"/>
+          </p:cNvSpPr>
+          <p:nvPr>
+            <p:ph type="body" idx="1"/>
+          </p:nvPr>
+        </p:nvSpPr>
+        <p:spPr/>
+        <p:txBody>
+          <a:bodyPr/>
+          <a:lstStyle/>
+          <a:p>
+            <a:endParaRPr lang="en-US"/>
+          </a:p>
+        </p:txBody>
+      </p:sp>
+      <p:sp>
+        <p:nvSpPr>
+          <p:cNvPr id="4" name="Slide Number Placeholder 3"/>
+          <p:cNvSpPr>
+            <a:spLocks noGrp="1"/>
+          </p:cNvSpPr>
+          <p:nvPr>
+            <p:ph type="sldNum" sz="quarter" idx="10"/>
+          </p:nvPr>
+        </p:nvSpPr>
+        <p:spPr/>
+        <p:txBody>
+          <a:bodyPr/>
+          <a:lstStyle/>
+          <a:p>
+            <a:fld id="{913AAEB1-1BB9-43BA-8E44-621D6A53A2EE}" type="slidenum">
+              <a:rPr lang="en-US" smtClean="0"/>
+              <a:t>29</a:t>
+            </a:fld>
+            <a:endParaRPr lang="en-US"/>
+          </a:p>
+        </p:txBody>
+      </p:sp>
+    </p:spTree>
+    <p:extLst>
+      <p:ext uri="{BB962C8B-B14F-4D97-AF65-F5344CB8AC3E}">
+        <p14:creationId xmlns:p14="http://schemas.microsoft.com/office/powerpoint/2010/main" val="2309939056"/>
       </p:ext>
     </p:extLst>
   </p:cSld>
@@ -626,13 +1661,43 @@
           <a:bodyPr/>
           <a:lstStyle/>
           <a:p>
+            <a:pPr marL="0" marR="0" lvl="0" indent="0" algn="l" defTabSz="914400" rtl="0" eaLnBrk="1" fontAlgn="auto" latinLnBrk="0" hangingPunct="1">
+              <a:lnSpc>
+                <a:spcPct val="100000"/>
+              </a:lnSpc>
+              <a:spcBef>
+                <a:spcPts val="0"/>
+              </a:spcBef>
+              <a:spcAft>
+                <a:spcPts val="0"/>
+              </a:spcAft>
+              <a:buClrTx/>
+              <a:buSzTx/>
+              <a:buFontTx/>
+              <a:buNone/>
+              <a:tabLst/>
+              <a:defRPr/>
+            </a:pPr>
             <a:r>
               <a:rPr lang="en-US">
-                <a:hlinkClick r:id="rId3"/>
-              </a:rPr>
-              <a:t>https://developer.mozilla.org/en-US/docs/Web/HTML/Inline_elements</a:t>
-            </a:r>
-            <a:endParaRPr lang="en-US"/>
+                <a:solidFill>
+                  <a:srgbClr val="00B0F0"/>
+                </a:solidFill>
+                <a:hlinkClick r:id="rId3">
+                  <a:extLst>
+                    <a:ext uri="{A12FA001-AC4F-418D-AE19-62706E023703}">
+                      <ahyp:hlinkClr xmlns:ahyp="http://schemas.microsoft.com/office/drawing/2018/hyperlinkcolor" val="tx"/>
+                    </a:ext>
+                  </a:extLst>
+                </a:hlinkClick>
+              </a:rPr>
+              <a:t>https://developer.mozilla.org/en-US/docs/Glossary/Doctype</a:t>
+            </a:r>
+            <a:endParaRPr lang="en-US">
+              <a:solidFill>
+                <a:srgbClr val="00B0F0"/>
+              </a:solidFill>
+            </a:endParaRPr>
           </a:p>
         </p:txBody>
       </p:sp>
@@ -653,7 +1718,7 @@
           <a:p>
             <a:fld id="{913AAEB1-1BB9-43BA-8E44-621D6A53A2EE}" type="slidenum">
               <a:rPr lang="en-US" smtClean="0"/>
-              <a:t>17</a:t>
+              <a:t>6</a:t>
             </a:fld>
             <a:endParaRPr lang="en-US"/>
           </a:p>
@@ -662,7 +1727,7 @@
     </p:spTree>
     <p:extLst>
       <p:ext uri="{BB962C8B-B14F-4D97-AF65-F5344CB8AC3E}">
-        <p14:creationId xmlns:p14="http://schemas.microsoft.com/office/powerpoint/2010/main" val="1069080471"/>
+        <p14:creationId xmlns:p14="http://schemas.microsoft.com/office/powerpoint/2010/main" val="2597189784"/>
       </p:ext>
     </p:extLst>
   </p:cSld>
@@ -716,6 +1781,50 @@
           <a:bodyPr/>
           <a:lstStyle/>
           <a:p>
+            <a:r>
+              <a:rPr lang="en-US">
+                <a:solidFill>
+                  <a:srgbClr val="00B0F0"/>
+                </a:solidFill>
+                <a:hlinkClick r:id="rId3">
+                  <a:extLst>
+                    <a:ext uri="{A12FA001-AC4F-418D-AE19-62706E023703}">
+                      <ahyp:hlinkClr xmlns:ahyp="http://schemas.microsoft.com/office/drawing/2018/hyperlinkcolor" val="tx"/>
+                    </a:ext>
+                  </a:extLst>
+                </a:hlinkClick>
+              </a:rPr>
+              <a:t>https://developer.mozilla.org/en-US/docs/Web/HTML/Element/html</a:t>
+            </a:r>
+            <a:endParaRPr lang="en-US" b="1">
+              <a:solidFill>
+                <a:srgbClr val="00B0F0"/>
+              </a:solidFill>
+            </a:endParaRPr>
+          </a:p>
+          <a:p>
+            <a:r>
+              <a:rPr lang="en-US">
+                <a:solidFill>
+                  <a:srgbClr val="00B0F0"/>
+                </a:solidFill>
+                <a:hlinkClick r:id="rId4">
+                  <a:extLst>
+                    <a:ext uri="{A12FA001-AC4F-418D-AE19-62706E023703}">
+                      <ahyp:hlinkClr xmlns:ahyp="http://schemas.microsoft.com/office/drawing/2018/hyperlinkcolor" val="tx"/>
+                    </a:ext>
+                  </a:extLst>
+                </a:hlinkClick>
+              </a:rPr>
+              <a:t>https://www.w3schools.com/Tags/tag_html.asp</a:t>
+            </a:r>
+            <a:endParaRPr lang="en-US">
+              <a:solidFill>
+                <a:srgbClr val="00B0F0"/>
+              </a:solidFill>
+            </a:endParaRPr>
+          </a:p>
+          <a:p>
             <a:endParaRPr lang="en-US"/>
           </a:p>
         </p:txBody>
@@ -727,7 +1836,7 @@
             <a:spLocks noGrp="1"/>
           </p:cNvSpPr>
           <p:nvPr>
-            <p:ph type="sldNum" sz="quarter" idx="10"/>
+            <p:ph type="sldNum" sz="quarter" idx="5"/>
           </p:nvPr>
         </p:nvSpPr>
         <p:spPr/>
@@ -737,7 +1846,7 @@
           <a:p>
             <a:fld id="{913AAEB1-1BB9-43BA-8E44-621D6A53A2EE}" type="slidenum">
               <a:rPr lang="en-US" smtClean="0"/>
-              <a:t>29</a:t>
+              <a:t>7</a:t>
             </a:fld>
             <a:endParaRPr lang="en-US"/>
           </a:p>
@@ -746,7 +1855,724 @@
     </p:spTree>
     <p:extLst>
       <p:ext uri="{BB962C8B-B14F-4D97-AF65-F5344CB8AC3E}">
-        <p14:creationId xmlns:p14="http://schemas.microsoft.com/office/powerpoint/2010/main" val="2309939056"/>
+        <p14:creationId xmlns:p14="http://schemas.microsoft.com/office/powerpoint/2010/main" val="2836367760"/>
+      </p:ext>
+    </p:extLst>
+  </p:cSld>
+  <p:clrMapOvr>
+    <a:masterClrMapping/>
+  </p:clrMapOvr>
+</p:notes>
+</file>
+
+<file path=ppt/notesSlides/notesSlide4.xml><?xml version="1.0" encoding="utf-8"?>
+<p:notes xmlns:a="http://schemas.openxmlformats.org/drawingml/2006/main" xmlns:r="http://schemas.openxmlformats.org/officeDocument/2006/relationships" xmlns:p="http://schemas.openxmlformats.org/presentationml/2006/main">
+  <p:cSld>
+    <p:spTree>
+      <p:nvGrpSpPr>
+        <p:cNvPr id="1" name=""/>
+        <p:cNvGrpSpPr/>
+        <p:nvPr/>
+      </p:nvGrpSpPr>
+      <p:grpSpPr>
+        <a:xfrm>
+          <a:off x="0" y="0"/>
+          <a:ext cx="0" cy="0"/>
+          <a:chOff x="0" y="0"/>
+          <a:chExt cx="0" cy="0"/>
+        </a:xfrm>
+      </p:grpSpPr>
+      <p:sp>
+        <p:nvSpPr>
+          <p:cNvPr id="2" name="Slide Image Placeholder 1"/>
+          <p:cNvSpPr>
+            <a:spLocks noGrp="1" noRot="1" noChangeAspect="1"/>
+          </p:cNvSpPr>
+          <p:nvPr>
+            <p:ph type="sldImg"/>
+          </p:nvPr>
+        </p:nvSpPr>
+        <p:spPr/>
+      </p:sp>
+      <p:sp>
+        <p:nvSpPr>
+          <p:cNvPr id="3" name="Notes Placeholder 2"/>
+          <p:cNvSpPr>
+            <a:spLocks noGrp="1"/>
+          </p:cNvSpPr>
+          <p:nvPr>
+            <p:ph type="body" idx="1"/>
+          </p:nvPr>
+        </p:nvSpPr>
+        <p:spPr/>
+        <p:txBody>
+          <a:bodyPr/>
+          <a:lstStyle/>
+          <a:p>
+            <a:pPr marL="0" marR="0" lvl="0" indent="0" algn="l" defTabSz="914400" rtl="0" eaLnBrk="1" fontAlgn="auto" latinLnBrk="0" hangingPunct="1">
+              <a:lnSpc>
+                <a:spcPct val="100000"/>
+              </a:lnSpc>
+              <a:spcBef>
+                <a:spcPts val="0"/>
+              </a:spcBef>
+              <a:spcAft>
+                <a:spcPts val="0"/>
+              </a:spcAft>
+              <a:buClrTx/>
+              <a:buSzTx/>
+              <a:buFontTx/>
+              <a:buNone/>
+              <a:tabLst/>
+              <a:defRPr/>
+            </a:pPr>
+            <a:r>
+              <a:rPr lang="en-US">
+                <a:solidFill>
+                  <a:srgbClr val="00B0F0"/>
+                </a:solidFill>
+                <a:hlinkClick r:id="rId3"/>
+              </a:rPr>
+              <a:t>https://developer.mozilla.org/en-US/docs/Web/HTML/Element/head</a:t>
+            </a:r>
+            <a:endParaRPr lang="en-US">
+              <a:solidFill>
+                <a:srgbClr val="00B0F0"/>
+              </a:solidFill>
+            </a:endParaRPr>
+          </a:p>
+          <a:p>
+            <a:endParaRPr lang="en-US"/>
+          </a:p>
+        </p:txBody>
+      </p:sp>
+      <p:sp>
+        <p:nvSpPr>
+          <p:cNvPr id="4" name="Slide Number Placeholder 3"/>
+          <p:cNvSpPr>
+            <a:spLocks noGrp="1"/>
+          </p:cNvSpPr>
+          <p:nvPr>
+            <p:ph type="sldNum" sz="quarter" idx="5"/>
+          </p:nvPr>
+        </p:nvSpPr>
+        <p:spPr/>
+        <p:txBody>
+          <a:bodyPr/>
+          <a:lstStyle/>
+          <a:p>
+            <a:fld id="{913AAEB1-1BB9-43BA-8E44-621D6A53A2EE}" type="slidenum">
+              <a:rPr lang="en-US" smtClean="0"/>
+              <a:t>8</a:t>
+            </a:fld>
+            <a:endParaRPr lang="en-US"/>
+          </a:p>
+        </p:txBody>
+      </p:sp>
+    </p:spTree>
+    <p:extLst>
+      <p:ext uri="{BB962C8B-B14F-4D97-AF65-F5344CB8AC3E}">
+        <p14:creationId xmlns:p14="http://schemas.microsoft.com/office/powerpoint/2010/main" val="1728053353"/>
+      </p:ext>
+    </p:extLst>
+  </p:cSld>
+  <p:clrMapOvr>
+    <a:masterClrMapping/>
+  </p:clrMapOvr>
+</p:notes>
+</file>
+
+<file path=ppt/notesSlides/notesSlide5.xml><?xml version="1.0" encoding="utf-8"?>
+<p:notes xmlns:a="http://schemas.openxmlformats.org/drawingml/2006/main" xmlns:r="http://schemas.openxmlformats.org/officeDocument/2006/relationships" xmlns:p="http://schemas.openxmlformats.org/presentationml/2006/main">
+  <p:cSld>
+    <p:spTree>
+      <p:nvGrpSpPr>
+        <p:cNvPr id="1" name=""/>
+        <p:cNvGrpSpPr/>
+        <p:nvPr/>
+      </p:nvGrpSpPr>
+      <p:grpSpPr>
+        <a:xfrm>
+          <a:off x="0" y="0"/>
+          <a:ext cx="0" cy="0"/>
+          <a:chOff x="0" y="0"/>
+          <a:chExt cx="0" cy="0"/>
+        </a:xfrm>
+      </p:grpSpPr>
+      <p:sp>
+        <p:nvSpPr>
+          <p:cNvPr id="2" name="Slide Image Placeholder 1"/>
+          <p:cNvSpPr>
+            <a:spLocks noGrp="1" noRot="1" noChangeAspect="1"/>
+          </p:cNvSpPr>
+          <p:nvPr>
+            <p:ph type="sldImg"/>
+          </p:nvPr>
+        </p:nvSpPr>
+        <p:spPr/>
+      </p:sp>
+      <p:sp>
+        <p:nvSpPr>
+          <p:cNvPr id="3" name="Notes Placeholder 2"/>
+          <p:cNvSpPr>
+            <a:spLocks noGrp="1"/>
+          </p:cNvSpPr>
+          <p:nvPr>
+            <p:ph type="body" idx="1"/>
+          </p:nvPr>
+        </p:nvSpPr>
+        <p:spPr/>
+        <p:txBody>
+          <a:bodyPr/>
+          <a:lstStyle/>
+          <a:p>
+            <a:pPr marL="0" marR="0" lvl="0" indent="0" algn="l" defTabSz="914400" rtl="0" eaLnBrk="1" fontAlgn="auto" latinLnBrk="0" hangingPunct="1">
+              <a:lnSpc>
+                <a:spcPct val="100000"/>
+              </a:lnSpc>
+              <a:spcBef>
+                <a:spcPts val="0"/>
+              </a:spcBef>
+              <a:spcAft>
+                <a:spcPts val="0"/>
+              </a:spcAft>
+              <a:buClrTx/>
+              <a:buSzTx/>
+              <a:buFontTx/>
+              <a:buNone/>
+              <a:tabLst/>
+              <a:defRPr/>
+            </a:pPr>
+            <a:r>
+              <a:rPr lang="en-US">
+                <a:hlinkClick r:id="rId3"/>
+              </a:rPr>
+              <a:t>https://developer.mozilla.org/en-US/docs/Web/HTML/Element/meta</a:t>
+            </a:r>
+            <a:endParaRPr lang="en-US">
+              <a:solidFill>
+                <a:srgbClr val="00B0F0"/>
+              </a:solidFill>
+            </a:endParaRPr>
+          </a:p>
+          <a:p>
+            <a:endParaRPr lang="en-US"/>
+          </a:p>
+        </p:txBody>
+      </p:sp>
+      <p:sp>
+        <p:nvSpPr>
+          <p:cNvPr id="4" name="Slide Number Placeholder 3"/>
+          <p:cNvSpPr>
+            <a:spLocks noGrp="1"/>
+          </p:cNvSpPr>
+          <p:nvPr>
+            <p:ph type="sldNum" sz="quarter" idx="5"/>
+          </p:nvPr>
+        </p:nvSpPr>
+        <p:spPr/>
+        <p:txBody>
+          <a:bodyPr/>
+          <a:lstStyle/>
+          <a:p>
+            <a:fld id="{913AAEB1-1BB9-43BA-8E44-621D6A53A2EE}" type="slidenum">
+              <a:rPr lang="en-US" smtClean="0"/>
+              <a:t>9</a:t>
+            </a:fld>
+            <a:endParaRPr lang="en-US"/>
+          </a:p>
+        </p:txBody>
+      </p:sp>
+    </p:spTree>
+    <p:extLst>
+      <p:ext uri="{BB962C8B-B14F-4D97-AF65-F5344CB8AC3E}">
+        <p14:creationId xmlns:p14="http://schemas.microsoft.com/office/powerpoint/2010/main" val="1963735165"/>
+      </p:ext>
+    </p:extLst>
+  </p:cSld>
+  <p:clrMapOvr>
+    <a:masterClrMapping/>
+  </p:clrMapOvr>
+</p:notes>
+</file>
+
+<file path=ppt/notesSlides/notesSlide6.xml><?xml version="1.0" encoding="utf-8"?>
+<p:notes xmlns:a="http://schemas.openxmlformats.org/drawingml/2006/main" xmlns:r="http://schemas.openxmlformats.org/officeDocument/2006/relationships" xmlns:p="http://schemas.openxmlformats.org/presentationml/2006/main">
+  <p:cSld>
+    <p:spTree>
+      <p:nvGrpSpPr>
+        <p:cNvPr id="1" name=""/>
+        <p:cNvGrpSpPr/>
+        <p:nvPr/>
+      </p:nvGrpSpPr>
+      <p:grpSpPr>
+        <a:xfrm>
+          <a:off x="0" y="0"/>
+          <a:ext cx="0" cy="0"/>
+          <a:chOff x="0" y="0"/>
+          <a:chExt cx="0" cy="0"/>
+        </a:xfrm>
+      </p:grpSpPr>
+      <p:sp>
+        <p:nvSpPr>
+          <p:cNvPr id="2" name="Slide Image Placeholder 1"/>
+          <p:cNvSpPr>
+            <a:spLocks noGrp="1" noRot="1" noChangeAspect="1"/>
+          </p:cNvSpPr>
+          <p:nvPr>
+            <p:ph type="sldImg"/>
+          </p:nvPr>
+        </p:nvSpPr>
+        <p:spPr/>
+      </p:sp>
+      <p:sp>
+        <p:nvSpPr>
+          <p:cNvPr id="3" name="Notes Placeholder 2"/>
+          <p:cNvSpPr>
+            <a:spLocks noGrp="1"/>
+          </p:cNvSpPr>
+          <p:nvPr>
+            <p:ph type="body" idx="1"/>
+          </p:nvPr>
+        </p:nvSpPr>
+        <p:spPr/>
+        <p:txBody>
+          <a:bodyPr/>
+          <a:lstStyle/>
+          <a:p>
+            <a:pPr marL="0" marR="0" lvl="0" indent="0" algn="l" defTabSz="914400" rtl="0" eaLnBrk="1" fontAlgn="auto" latinLnBrk="0" hangingPunct="1">
+              <a:lnSpc>
+                <a:spcPct val="100000"/>
+              </a:lnSpc>
+              <a:spcBef>
+                <a:spcPts val="0"/>
+              </a:spcBef>
+              <a:spcAft>
+                <a:spcPts val="0"/>
+              </a:spcAft>
+              <a:buClrTx/>
+              <a:buSzTx/>
+              <a:buFontTx/>
+              <a:buNone/>
+              <a:tabLst/>
+              <a:defRPr/>
+            </a:pPr>
+            <a:r>
+              <a:rPr lang="en-US">
+                <a:solidFill>
+                  <a:srgbClr val="00B0F0"/>
+                </a:solidFill>
+                <a:hlinkClick r:id="rId3">
+                  <a:extLst>
+                    <a:ext uri="{A12FA001-AC4F-418D-AE19-62706E023703}">
+                      <ahyp:hlinkClr xmlns:ahyp="http://schemas.microsoft.com/office/drawing/2018/hyperlinkcolor" val="tx"/>
+                    </a:ext>
+                  </a:extLst>
+                </a:hlinkClick>
+              </a:rPr>
+              <a:t>https://developer.mozilla.org/en-US/docs/Web/HTML/Element/title</a:t>
+            </a:r>
+            <a:endParaRPr lang="en-US">
+              <a:solidFill>
+                <a:srgbClr val="00B0F0"/>
+              </a:solidFill>
+            </a:endParaRPr>
+          </a:p>
+          <a:p>
+            <a:endParaRPr lang="en-US"/>
+          </a:p>
+        </p:txBody>
+      </p:sp>
+      <p:sp>
+        <p:nvSpPr>
+          <p:cNvPr id="4" name="Slide Number Placeholder 3"/>
+          <p:cNvSpPr>
+            <a:spLocks noGrp="1"/>
+          </p:cNvSpPr>
+          <p:nvPr>
+            <p:ph type="sldNum" sz="quarter" idx="5"/>
+          </p:nvPr>
+        </p:nvSpPr>
+        <p:spPr/>
+        <p:txBody>
+          <a:bodyPr/>
+          <a:lstStyle/>
+          <a:p>
+            <a:fld id="{913AAEB1-1BB9-43BA-8E44-621D6A53A2EE}" type="slidenum">
+              <a:rPr lang="en-US" smtClean="0"/>
+              <a:t>10</a:t>
+            </a:fld>
+            <a:endParaRPr lang="en-US"/>
+          </a:p>
+        </p:txBody>
+      </p:sp>
+    </p:spTree>
+    <p:extLst>
+      <p:ext uri="{BB962C8B-B14F-4D97-AF65-F5344CB8AC3E}">
+        <p14:creationId xmlns:p14="http://schemas.microsoft.com/office/powerpoint/2010/main" val="3732344039"/>
+      </p:ext>
+    </p:extLst>
+  </p:cSld>
+  <p:clrMapOvr>
+    <a:masterClrMapping/>
+  </p:clrMapOvr>
+</p:notes>
+</file>
+
+<file path=ppt/notesSlides/notesSlide7.xml><?xml version="1.0" encoding="utf-8"?>
+<p:notes xmlns:a="http://schemas.openxmlformats.org/drawingml/2006/main" xmlns:r="http://schemas.openxmlformats.org/officeDocument/2006/relationships" xmlns:p="http://schemas.openxmlformats.org/presentationml/2006/main">
+  <p:cSld>
+    <p:spTree>
+      <p:nvGrpSpPr>
+        <p:cNvPr id="1" name=""/>
+        <p:cNvGrpSpPr/>
+        <p:nvPr/>
+      </p:nvGrpSpPr>
+      <p:grpSpPr>
+        <a:xfrm>
+          <a:off x="0" y="0"/>
+          <a:ext cx="0" cy="0"/>
+          <a:chOff x="0" y="0"/>
+          <a:chExt cx="0" cy="0"/>
+        </a:xfrm>
+      </p:grpSpPr>
+      <p:sp>
+        <p:nvSpPr>
+          <p:cNvPr id="2" name="Slide Image Placeholder 1"/>
+          <p:cNvSpPr>
+            <a:spLocks noGrp="1" noRot="1" noChangeAspect="1"/>
+          </p:cNvSpPr>
+          <p:nvPr>
+            <p:ph type="sldImg"/>
+          </p:nvPr>
+        </p:nvSpPr>
+        <p:spPr/>
+      </p:sp>
+      <p:sp>
+        <p:nvSpPr>
+          <p:cNvPr id="3" name="Notes Placeholder 2"/>
+          <p:cNvSpPr>
+            <a:spLocks noGrp="1"/>
+          </p:cNvSpPr>
+          <p:nvPr>
+            <p:ph type="body" idx="1"/>
+          </p:nvPr>
+        </p:nvSpPr>
+        <p:spPr/>
+        <p:txBody>
+          <a:bodyPr/>
+          <a:lstStyle/>
+          <a:p>
+            <a:pPr marL="0" marR="0" lvl="0" indent="0" algn="l" defTabSz="914400" rtl="0" eaLnBrk="1" fontAlgn="auto" latinLnBrk="0" hangingPunct="1">
+              <a:lnSpc>
+                <a:spcPct val="100000"/>
+              </a:lnSpc>
+              <a:spcBef>
+                <a:spcPts val="0"/>
+              </a:spcBef>
+              <a:spcAft>
+                <a:spcPts val="0"/>
+              </a:spcAft>
+              <a:buClrTx/>
+              <a:buSzTx/>
+              <a:buFontTx/>
+              <a:buNone/>
+              <a:tabLst/>
+              <a:defRPr/>
+            </a:pPr>
+            <a:r>
+              <a:rPr lang="en-US">
+                <a:solidFill>
+                  <a:srgbClr val="00B0F0"/>
+                </a:solidFill>
+                <a:hlinkClick r:id="rId3"/>
+              </a:rPr>
+              <a:t>https://developer.mozilla.org/en-US/docs/Web/HTML/Element/link</a:t>
+            </a:r>
+            <a:endParaRPr lang="en-US">
+              <a:solidFill>
+                <a:srgbClr val="00B0F0"/>
+              </a:solidFill>
+            </a:endParaRPr>
+          </a:p>
+          <a:p>
+            <a:endParaRPr lang="en-US"/>
+          </a:p>
+        </p:txBody>
+      </p:sp>
+      <p:sp>
+        <p:nvSpPr>
+          <p:cNvPr id="4" name="Slide Number Placeholder 3"/>
+          <p:cNvSpPr>
+            <a:spLocks noGrp="1"/>
+          </p:cNvSpPr>
+          <p:nvPr>
+            <p:ph type="sldNum" sz="quarter" idx="5"/>
+          </p:nvPr>
+        </p:nvSpPr>
+        <p:spPr/>
+        <p:txBody>
+          <a:bodyPr/>
+          <a:lstStyle/>
+          <a:p>
+            <a:fld id="{913AAEB1-1BB9-43BA-8E44-621D6A53A2EE}" type="slidenum">
+              <a:rPr lang="en-US" smtClean="0"/>
+              <a:t>11</a:t>
+            </a:fld>
+            <a:endParaRPr lang="en-US"/>
+          </a:p>
+        </p:txBody>
+      </p:sp>
+    </p:spTree>
+    <p:extLst>
+      <p:ext uri="{BB962C8B-B14F-4D97-AF65-F5344CB8AC3E}">
+        <p14:creationId xmlns:p14="http://schemas.microsoft.com/office/powerpoint/2010/main" val="3735210607"/>
+      </p:ext>
+    </p:extLst>
+  </p:cSld>
+  <p:clrMapOvr>
+    <a:masterClrMapping/>
+  </p:clrMapOvr>
+</p:notes>
+</file>
+
+<file path=ppt/notesSlides/notesSlide8.xml><?xml version="1.0" encoding="utf-8"?>
+<p:notes xmlns:a="http://schemas.openxmlformats.org/drawingml/2006/main" xmlns:r="http://schemas.openxmlformats.org/officeDocument/2006/relationships" xmlns:p="http://schemas.openxmlformats.org/presentationml/2006/main">
+  <p:cSld>
+    <p:spTree>
+      <p:nvGrpSpPr>
+        <p:cNvPr id="1" name=""/>
+        <p:cNvGrpSpPr/>
+        <p:nvPr/>
+      </p:nvGrpSpPr>
+      <p:grpSpPr>
+        <a:xfrm>
+          <a:off x="0" y="0"/>
+          <a:ext cx="0" cy="0"/>
+          <a:chOff x="0" y="0"/>
+          <a:chExt cx="0" cy="0"/>
+        </a:xfrm>
+      </p:grpSpPr>
+      <p:sp>
+        <p:nvSpPr>
+          <p:cNvPr id="2" name="Slide Image Placeholder 1"/>
+          <p:cNvSpPr>
+            <a:spLocks noGrp="1" noRot="1" noChangeAspect="1"/>
+          </p:cNvSpPr>
+          <p:nvPr>
+            <p:ph type="sldImg"/>
+          </p:nvPr>
+        </p:nvSpPr>
+        <p:spPr/>
+      </p:sp>
+      <p:sp>
+        <p:nvSpPr>
+          <p:cNvPr id="3" name="Notes Placeholder 2"/>
+          <p:cNvSpPr>
+            <a:spLocks noGrp="1"/>
+          </p:cNvSpPr>
+          <p:nvPr>
+            <p:ph type="body" idx="1"/>
+          </p:nvPr>
+        </p:nvSpPr>
+        <p:spPr/>
+        <p:txBody>
+          <a:bodyPr/>
+          <a:lstStyle/>
+          <a:p>
+            <a:pPr marL="0" marR="0" lvl="0" indent="0" algn="l" defTabSz="914400" rtl="0" eaLnBrk="1" fontAlgn="auto" latinLnBrk="0" hangingPunct="1">
+              <a:lnSpc>
+                <a:spcPct val="100000"/>
+              </a:lnSpc>
+              <a:spcBef>
+                <a:spcPts val="0"/>
+              </a:spcBef>
+              <a:spcAft>
+                <a:spcPts val="0"/>
+              </a:spcAft>
+              <a:buClrTx/>
+              <a:buSzTx/>
+              <a:buFontTx/>
+              <a:buNone/>
+              <a:tabLst/>
+              <a:defRPr/>
+            </a:pPr>
+            <a:r>
+              <a:rPr lang="en-US" sz="1200">
+                <a:solidFill>
+                  <a:srgbClr val="00B0F0"/>
+                </a:solidFill>
+                <a:hlinkClick r:id="rId3">
+                  <a:extLst>
+                    <a:ext uri="{A12FA001-AC4F-418D-AE19-62706E023703}">
+                      <ahyp:hlinkClr xmlns:ahyp="http://schemas.microsoft.com/office/drawing/2018/hyperlinkcolor" val="tx"/>
+                    </a:ext>
+                  </a:extLst>
+                </a:hlinkClick>
+              </a:rPr>
+              <a:t>https://developer.mozilla.org/en-US/docs/Web/HTML/Element#Content_sectioning</a:t>
+            </a:r>
+            <a:endParaRPr lang="en-US" sz="1200">
+              <a:solidFill>
+                <a:srgbClr val="00B0F0"/>
+              </a:solidFill>
+            </a:endParaRPr>
+          </a:p>
+          <a:p>
+            <a:endParaRPr lang="en-US"/>
+          </a:p>
+        </p:txBody>
+      </p:sp>
+      <p:sp>
+        <p:nvSpPr>
+          <p:cNvPr id="4" name="Slide Number Placeholder 3"/>
+          <p:cNvSpPr>
+            <a:spLocks noGrp="1"/>
+          </p:cNvSpPr>
+          <p:nvPr>
+            <p:ph type="sldNum" sz="quarter" idx="5"/>
+          </p:nvPr>
+        </p:nvSpPr>
+        <p:spPr/>
+        <p:txBody>
+          <a:bodyPr/>
+          <a:lstStyle/>
+          <a:p>
+            <a:fld id="{913AAEB1-1BB9-43BA-8E44-621D6A53A2EE}" type="slidenum">
+              <a:rPr lang="en-US" smtClean="0"/>
+              <a:t>13</a:t>
+            </a:fld>
+            <a:endParaRPr lang="en-US"/>
+          </a:p>
+        </p:txBody>
+      </p:sp>
+    </p:spTree>
+    <p:extLst>
+      <p:ext uri="{BB962C8B-B14F-4D97-AF65-F5344CB8AC3E}">
+        <p14:creationId xmlns:p14="http://schemas.microsoft.com/office/powerpoint/2010/main" val="3636892330"/>
+      </p:ext>
+    </p:extLst>
+  </p:cSld>
+  <p:clrMapOvr>
+    <a:masterClrMapping/>
+  </p:clrMapOvr>
+</p:notes>
+</file>
+
+<file path=ppt/notesSlides/notesSlide9.xml><?xml version="1.0" encoding="utf-8"?>
+<p:notes xmlns:a="http://schemas.openxmlformats.org/drawingml/2006/main" xmlns:r="http://schemas.openxmlformats.org/officeDocument/2006/relationships" xmlns:p="http://schemas.openxmlformats.org/presentationml/2006/main">
+  <p:cSld>
+    <p:spTree>
+      <p:nvGrpSpPr>
+        <p:cNvPr id="1" name=""/>
+        <p:cNvGrpSpPr/>
+        <p:nvPr/>
+      </p:nvGrpSpPr>
+      <p:grpSpPr>
+        <a:xfrm>
+          <a:off x="0" y="0"/>
+          <a:ext cx="0" cy="0"/>
+          <a:chOff x="0" y="0"/>
+          <a:chExt cx="0" cy="0"/>
+        </a:xfrm>
+      </p:grpSpPr>
+      <p:sp>
+        <p:nvSpPr>
+          <p:cNvPr id="2" name="Slide Image Placeholder 1"/>
+          <p:cNvSpPr>
+            <a:spLocks noGrp="1" noRot="1" noChangeAspect="1"/>
+          </p:cNvSpPr>
+          <p:nvPr>
+            <p:ph type="sldImg"/>
+          </p:nvPr>
+        </p:nvSpPr>
+        <p:spPr/>
+      </p:sp>
+      <p:sp>
+        <p:nvSpPr>
+          <p:cNvPr id="3" name="Notes Placeholder 2"/>
+          <p:cNvSpPr>
+            <a:spLocks noGrp="1"/>
+          </p:cNvSpPr>
+          <p:nvPr>
+            <p:ph type="body" idx="1"/>
+          </p:nvPr>
+        </p:nvSpPr>
+        <p:spPr/>
+        <p:txBody>
+          <a:bodyPr/>
+          <a:lstStyle/>
+          <a:p>
+            <a:pPr marL="0" marR="0" lvl="0" indent="0" algn="l" defTabSz="914400" rtl="0" eaLnBrk="1" fontAlgn="auto" latinLnBrk="0" hangingPunct="1">
+              <a:lnSpc>
+                <a:spcPct val="100000"/>
+              </a:lnSpc>
+              <a:spcBef>
+                <a:spcPts val="0"/>
+              </a:spcBef>
+              <a:spcAft>
+                <a:spcPts val="0"/>
+              </a:spcAft>
+              <a:buClrTx/>
+              <a:buSzTx/>
+              <a:buFontTx/>
+              <a:buNone/>
+              <a:tabLst/>
+              <a:defRPr/>
+            </a:pPr>
+            <a:r>
+              <a:rPr lang="en-US">
+                <a:solidFill>
+                  <a:srgbClr val="00B0F0"/>
+                </a:solidFill>
+                <a:hlinkClick r:id="rId3">
+                  <a:extLst>
+                    <a:ext uri="{A12FA001-AC4F-418D-AE19-62706E023703}">
+                      <ahyp:hlinkClr xmlns:ahyp="http://schemas.microsoft.com/office/drawing/2018/hyperlinkcolor" val="tx"/>
+                    </a:ext>
+                  </a:extLst>
+                </a:hlinkClick>
+              </a:rPr>
+              <a:t>https://developer.mozilla.org/en-US/docs/Web/HTML/Element/div</a:t>
+            </a:r>
+            <a:endParaRPr lang="en-US">
+              <a:solidFill>
+                <a:srgbClr val="00B0F0"/>
+              </a:solidFill>
+            </a:endParaRPr>
+          </a:p>
+          <a:p>
+            <a:endParaRPr lang="en-US"/>
+          </a:p>
+        </p:txBody>
+      </p:sp>
+      <p:sp>
+        <p:nvSpPr>
+          <p:cNvPr id="4" name="Slide Number Placeholder 3"/>
+          <p:cNvSpPr>
+            <a:spLocks noGrp="1"/>
+          </p:cNvSpPr>
+          <p:nvPr>
+            <p:ph type="sldNum" sz="quarter" idx="5"/>
+          </p:nvPr>
+        </p:nvSpPr>
+        <p:spPr/>
+        <p:txBody>
+          <a:bodyPr/>
+          <a:lstStyle/>
+          <a:p>
+            <a:fld id="{913AAEB1-1BB9-43BA-8E44-621D6A53A2EE}" type="slidenum">
+              <a:rPr lang="en-US" smtClean="0"/>
+              <a:t>14</a:t>
+            </a:fld>
+            <a:endParaRPr lang="en-US"/>
+          </a:p>
+        </p:txBody>
+      </p:sp>
+    </p:spTree>
+    <p:extLst>
+      <p:ext uri="{BB962C8B-B14F-4D97-AF65-F5344CB8AC3E}">
+        <p14:creationId xmlns:p14="http://schemas.microsoft.com/office/powerpoint/2010/main" val="2099904848"/>
       </p:ext>
     </p:extLst>
   </p:cSld>
@@ -1225,7 +3051,7 @@
           <a:p>
             <a:fld id="{E9F25E47-8026-47FD-8FD6-2C7B55A6BE4F}" type="datetime1">
               <a:rPr lang="en-US" smtClean="0"/>
-              <a:t>7/28/2020</a:t>
+              <a:t>7/29/2020</a:t>
             </a:fld>
             <a:endParaRPr lang="en-US" dirty="0"/>
           </a:p>
@@ -1427,7 +3253,7 @@
           <a:p>
             <a:fld id="{49F0A7AA-AB30-4D36-B646-A02FA5DCCA55}" type="datetime1">
               <a:rPr lang="en-US" smtClean="0"/>
-              <a:t>7/28/2020</a:t>
+              <a:t>7/29/2020</a:t>
             </a:fld>
             <a:endParaRPr lang="en-US" dirty="0"/>
           </a:p>
@@ -2026,7 +3852,7 @@
           <a:p>
             <a:fld id="{CFA4D178-B71E-4B10-AF0F-C5E0B7294A7C}" type="datetime1">
               <a:rPr lang="en-US" smtClean="0"/>
-              <a:t>7/28/2020</a:t>
+              <a:t>7/29/2020</a:t>
             </a:fld>
             <a:endParaRPr lang="en-US" dirty="0"/>
           </a:p>
@@ -2346,7 +4172,7 @@
           <a:p>
             <a:fld id="{27E6D853-85C2-4120-A6B2-2EAC4467BF8B}" type="datetime1">
               <a:rPr lang="en-US" smtClean="0"/>
-              <a:t>7/28/2020</a:t>
+              <a:t>7/29/2020</a:t>
             </a:fld>
             <a:endParaRPr lang="en-US" dirty="0"/>
           </a:p>
@@ -2783,7 +4609,7 @@
           <a:p>
             <a:fld id="{CA3AECF5-4644-4878-B4B4-3AC946C4B252}" type="datetime1">
               <a:rPr lang="en-US" smtClean="0"/>
-              <a:t>7/28/2020</a:t>
+              <a:t>7/29/2020</a:t>
             </a:fld>
             <a:endParaRPr lang="en-US" dirty="0"/>
           </a:p>
@@ -2901,7 +4727,7 @@
           <a:p>
             <a:fld id="{B8E389F8-4EAE-4B22-8731-40270585493B}" type="datetime1">
               <a:rPr lang="en-US" smtClean="0"/>
-              <a:t>7/28/2020</a:t>
+              <a:t>7/29/2020</a:t>
             </a:fld>
             <a:endParaRPr lang="en-US" dirty="0"/>
           </a:p>
@@ -2996,7 +4822,7 @@
           <a:p>
             <a:fld id="{772F4F3F-699B-4D10-AAB9-00C2579C25F8}" type="datetime1">
               <a:rPr lang="en-US" smtClean="0"/>
-              <a:t>7/28/2020</a:t>
+              <a:t>7/29/2020</a:t>
             </a:fld>
             <a:endParaRPr lang="en-US" dirty="0"/>
           </a:p>
@@ -3413,7 +5239,7 @@
           <a:p>
             <a:fld id="{E51BA90F-EE6C-42F5-8961-2F52EE18037D}" type="datetime1">
               <a:rPr lang="en-US" smtClean="0"/>
-              <a:t>7/28/2020</a:t>
+              <a:t>7/29/2020</a:t>
             </a:fld>
             <a:endParaRPr lang="en-US" dirty="0"/>
           </a:p>
@@ -3674,7 +5500,7 @@
           <a:p>
             <a:fld id="{FB6292F5-AD2B-47F4-B460-BF55BF34C27D}" type="datetime1">
               <a:rPr lang="en-US" smtClean="0"/>
-              <a:t>7/28/2020</a:t>
+              <a:t>7/29/2020</a:t>
             </a:fld>
             <a:endParaRPr lang="en-US" dirty="0"/>
           </a:p>
@@ -4190,7 +6016,7 @@
           <a:p>
             <a:fld id="{8B88B800-945A-43B0-8EA5-8657D67FD7E1}" type="datetime1">
               <a:rPr lang="en-US" smtClean="0"/>
-              <a:t>7/28/2020</a:t>
+              <a:t>7/29/2020</a:t>
             </a:fld>
             <a:endParaRPr lang="en-US" dirty="0"/>
           </a:p>
@@ -4996,7 +6822,7 @@
                 </a:solidFill>
                 <a:latin typeface="Consolas" panose="020B0609020204030204" pitchFamily="49" charset="0"/>
                 <a:cs typeface="Arial" panose="020B0604020202020204" pitchFamily="34" charset="0"/>
-                <a:hlinkClick r:id="rId2">
+                <a:hlinkClick r:id="rId3">
                   <a:extLst>
                     <a:ext uri="{A12FA001-AC4F-418D-AE19-62706E023703}">
                       <ahyp:hlinkClr xmlns:ahyp="http://schemas.microsoft.com/office/drawing/2018/hyperlinkcolor" val="tx"/>
@@ -5210,7 +7036,7 @@
                 <a:solidFill>
                   <a:srgbClr val="00B0F0"/>
                 </a:solidFill>
-                <a:hlinkClick r:id="rId2">
+                <a:hlinkClick r:id="rId3">
                   <a:extLst>
                     <a:ext uri="{A12FA001-AC4F-418D-AE19-62706E023703}">
                       <ahyp:hlinkClr xmlns:ahyp="http://schemas.microsoft.com/office/drawing/2018/hyperlinkcolor" val="tx"/>
@@ -5225,7 +7051,7 @@
                 <a:solidFill>
                   <a:srgbClr val="00B0F0"/>
                 </a:solidFill>
-                <a:hlinkClick r:id="rId2">
+                <a:hlinkClick r:id="rId3">
                   <a:extLst>
                     <a:ext uri="{A12FA001-AC4F-418D-AE19-62706E023703}">
                       <ahyp:hlinkClr xmlns:ahyp="http://schemas.microsoft.com/office/drawing/2018/hyperlinkcolor" val="tx"/>
@@ -5346,7 +7172,7 @@
             <a:r>
               <a:rPr lang="en-US" sz="1800" b="1">
                 <a:latin typeface="Consolas" panose="020B0609020204030204" pitchFamily="49" charset="0"/>
-                <a:hlinkClick r:id="rId2"/>
+                <a:hlinkClick r:id="rId3"/>
               </a:rPr>
               <a:t>&lt;link&gt;</a:t>
             </a:r>
@@ -5516,7 +7342,7 @@
                 <a:solidFill>
                   <a:srgbClr val="00B0F0"/>
                 </a:solidFill>
-                <a:hlinkClick r:id="rId2"/>
+                <a:hlinkClick r:id="rId3"/>
               </a:rPr>
               <a:t>https://developer.mozilla.org/en-US/docs/Web/HTML/Element</a:t>
             </a:r>
@@ -5525,7 +7351,7 @@
                 <a:solidFill>
                   <a:srgbClr val="00B0F0"/>
                 </a:solidFill>
-                <a:hlinkClick r:id="rId2"/>
+                <a:hlinkClick r:id="rId3"/>
               </a:rPr>
               <a:t>/link</a:t>
             </a:r>
@@ -5754,7 +7580,7 @@
               <a:rPr lang="fr-FR" sz="1800" b="1">
                 <a:latin typeface="Consolas" panose="020B0609020204030204" pitchFamily="49" charset="0"/>
                 <a:cs typeface="Arial" panose="020B0604020202020204" pitchFamily="34" charset="0"/>
-                <a:hlinkClick r:id="rId2"/>
+                <a:hlinkClick r:id="rId3"/>
               </a:rPr>
               <a:t>&lt;header&gt;</a:t>
             </a:r>
@@ -5777,7 +7603,7 @@
               <a:rPr lang="fr-FR" sz="1800" b="1">
                 <a:latin typeface="Consolas" panose="020B0609020204030204" pitchFamily="49" charset="0"/>
                 <a:cs typeface="Arial" panose="020B0604020202020204" pitchFamily="34" charset="0"/>
-                <a:hlinkClick r:id="rId3"/>
+                <a:hlinkClick r:id="rId4"/>
               </a:rPr>
               <a:t>&lt;nav&gt;</a:t>
             </a:r>
@@ -5800,7 +7626,7 @@
               <a:rPr lang="fr-FR" sz="1800" b="1">
                 <a:latin typeface="Consolas" panose="020B0609020204030204" pitchFamily="49" charset="0"/>
                 <a:cs typeface="Arial" panose="020B0604020202020204" pitchFamily="34" charset="0"/>
-                <a:hlinkClick r:id="rId4"/>
+                <a:hlinkClick r:id="rId5"/>
               </a:rPr>
               <a:t>&lt;main&gt;</a:t>
             </a:r>
@@ -5823,7 +7649,7 @@
               <a:rPr lang="fr-FR" sz="1800" b="1">
                 <a:latin typeface="Consolas" panose="020B0609020204030204" pitchFamily="49" charset="0"/>
                 <a:cs typeface="Arial" panose="020B0604020202020204" pitchFamily="34" charset="0"/>
-                <a:hlinkClick r:id="rId5"/>
+                <a:hlinkClick r:id="rId6"/>
               </a:rPr>
               <a:t>&lt;section&gt;</a:t>
             </a:r>
@@ -5846,7 +7672,7 @@
               <a:rPr lang="fr-FR" sz="1800" b="1">
                 <a:latin typeface="Consolas" panose="020B0609020204030204" pitchFamily="49" charset="0"/>
                 <a:cs typeface="Arial" panose="020B0604020202020204" pitchFamily="34" charset="0"/>
-                <a:hlinkClick r:id="rId6"/>
+                <a:hlinkClick r:id="rId7"/>
               </a:rPr>
               <a:t>&lt;article&gt;</a:t>
             </a:r>
@@ -5869,7 +7695,7 @@
               <a:rPr lang="fr-FR" sz="1800" b="1">
                 <a:latin typeface="Consolas" panose="020B0609020204030204" pitchFamily="49" charset="0"/>
                 <a:cs typeface="Arial" panose="020B0604020202020204" pitchFamily="34" charset="0"/>
-                <a:hlinkClick r:id="rId7"/>
+                <a:hlinkClick r:id="rId8"/>
               </a:rPr>
               <a:t>&lt;aside&gt;</a:t>
             </a:r>
@@ -5892,7 +7718,7 @@
               <a:rPr lang="fr-FR" sz="1800" b="1">
                 <a:latin typeface="Consolas" panose="020B0609020204030204" pitchFamily="49" charset="0"/>
                 <a:cs typeface="Arial" panose="020B0604020202020204" pitchFamily="34" charset="0"/>
-                <a:hlinkClick r:id="rId8"/>
+                <a:hlinkClick r:id="rId9"/>
               </a:rPr>
               <a:t>&lt;footer&gt;</a:t>
             </a:r>
@@ -5980,7 +7806,7 @@
                 <a:solidFill>
                   <a:srgbClr val="00B0F0"/>
                 </a:solidFill>
-                <a:hlinkClick r:id="rId9">
+                <a:hlinkClick r:id="rId10">
                   <a:extLst>
                     <a:ext uri="{A12FA001-AC4F-418D-AE19-62706E023703}">
                       <ahyp:hlinkClr xmlns:ahyp="http://schemas.microsoft.com/office/drawing/2018/hyperlinkcolor" val="tx"/>
@@ -6013,7 +7839,7 @@
           <p:nvPr>
             <p:extLst>
               <p:ext uri="{D42A27DB-BD31-4B8C-83A1-F6EECF244321}">
-                <p14:modId xmlns:p14="http://schemas.microsoft.com/office/powerpoint/2010/main" val="1414465819"/>
+                <p14:modId xmlns:p14="http://schemas.microsoft.com/office/powerpoint/2010/main" val="4098374469"/>
               </p:ext>
             </p:extLst>
           </p:nvPr>
@@ -6643,7 +8469,7 @@
                 </a:solidFill>
                 <a:latin typeface="Consolas" panose="020B0609020204030204" pitchFamily="49" charset="0"/>
                 <a:cs typeface="Arial" panose="020B0604020202020204" pitchFamily="34" charset="0"/>
-                <a:hlinkClick r:id="rId2">
+                <a:hlinkClick r:id="rId3">
                   <a:extLst>
                     <a:ext uri="{A12FA001-AC4F-418D-AE19-62706E023703}">
                       <ahyp:hlinkClr xmlns:ahyp="http://schemas.microsoft.com/office/drawing/2018/hyperlinkcolor" val="tx"/>
@@ -6660,7 +8486,7 @@
                 </a:solidFill>
                 <a:latin typeface="Consolas" panose="020B0609020204030204" pitchFamily="49" charset="0"/>
                 <a:cs typeface="Arial" panose="020B0604020202020204" pitchFamily="34" charset="0"/>
-                <a:hlinkClick r:id="rId2">
+                <a:hlinkClick r:id="rId3">
                   <a:extLst>
                     <a:ext uri="{A12FA001-AC4F-418D-AE19-62706E023703}">
                       <ahyp:hlinkClr xmlns:ahyp="http://schemas.microsoft.com/office/drawing/2018/hyperlinkcolor" val="tx"/>
@@ -6677,7 +8503,7 @@
                 </a:solidFill>
                 <a:latin typeface="Consolas" panose="020B0609020204030204" pitchFamily="49" charset="0"/>
                 <a:cs typeface="Arial" panose="020B0604020202020204" pitchFamily="34" charset="0"/>
-                <a:hlinkClick r:id="rId2">
+                <a:hlinkClick r:id="rId3">
                   <a:extLst>
                     <a:ext uri="{A12FA001-AC4F-418D-AE19-62706E023703}">
                       <ahyp:hlinkClr xmlns:ahyp="http://schemas.microsoft.com/office/drawing/2018/hyperlinkcolor" val="tx"/>
@@ -6763,7 +8589,7 @@
                 <a:solidFill>
                   <a:srgbClr val="00B0F0"/>
                 </a:solidFill>
-                <a:hlinkClick r:id="rId2">
+                <a:hlinkClick r:id="rId3">
                   <a:extLst>
                     <a:ext uri="{A12FA001-AC4F-418D-AE19-62706E023703}">
                       <ahyp:hlinkClr xmlns:ahyp="http://schemas.microsoft.com/office/drawing/2018/hyperlinkcolor" val="tx"/>
@@ -6778,7 +8604,7 @@
                 <a:solidFill>
                   <a:srgbClr val="00B0F0"/>
                 </a:solidFill>
-                <a:hlinkClick r:id="rId2">
+                <a:hlinkClick r:id="rId3">
                   <a:extLst>
                     <a:ext uri="{A12FA001-AC4F-418D-AE19-62706E023703}">
                       <ahyp:hlinkClr xmlns:ahyp="http://schemas.microsoft.com/office/drawing/2018/hyperlinkcolor" val="tx"/>
@@ -6912,7 +8738,7 @@
                 </a:solidFill>
                 <a:latin typeface="Consolas" panose="020B0609020204030204" pitchFamily="49" charset="0"/>
                 <a:cs typeface="Arial" panose="020B0604020202020204" pitchFamily="34" charset="0"/>
-                <a:hlinkClick r:id="rId2">
+                <a:hlinkClick r:id="rId3">
                   <a:extLst>
                     <a:ext uri="{A12FA001-AC4F-418D-AE19-62706E023703}">
                       <ahyp:hlinkClr xmlns:ahyp="http://schemas.microsoft.com/office/drawing/2018/hyperlinkcolor" val="tx"/>
@@ -7007,7 +8833,7 @@
                 <a:solidFill>
                   <a:srgbClr val="00B0F0"/>
                 </a:solidFill>
-                <a:hlinkClick r:id="rId2">
+                <a:hlinkClick r:id="rId3">
                   <a:extLst>
                     <a:ext uri="{A12FA001-AC4F-418D-AE19-62706E023703}">
                       <ahyp:hlinkClr xmlns:ahyp="http://schemas.microsoft.com/office/drawing/2018/hyperlinkcolor" val="tx"/>
@@ -7022,7 +8848,7 @@
                 <a:solidFill>
                   <a:srgbClr val="00B0F0"/>
                 </a:solidFill>
-                <a:hlinkClick r:id="rId2">
+                <a:hlinkClick r:id="rId3">
                   <a:extLst>
                     <a:ext uri="{A12FA001-AC4F-418D-AE19-62706E023703}">
                       <ahyp:hlinkClr xmlns:ahyp="http://schemas.microsoft.com/office/drawing/2018/hyperlinkcolor" val="tx"/>
@@ -7131,10 +8957,17 @@
               <a:t>By default, a </a:t>
             </a:r>
             <a:r>
+              <a:rPr lang="en-US" sz="2400" b="1" dirty="0">
+                <a:cs typeface="Arial" panose="020B0604020202020204" pitchFamily="34" charset="0"/>
+                <a:hlinkClick r:id="rId3"/>
+              </a:rPr>
+              <a:t>block-level element</a:t>
+            </a:r>
+            <a:r>
               <a:rPr lang="en-US" sz="2400" dirty="0">
                 <a:cs typeface="Arial" panose="020B0604020202020204" pitchFamily="34" charset="0"/>
               </a:rPr>
-              <a:t>block-level element occupies the </a:t>
+              <a:t> occupies the </a:t>
             </a:r>
             <a:r>
               <a:rPr lang="en-US" sz="2400">
@@ -7243,6 +9076,49 @@
               <a:t>16</a:t>
             </a:fld>
             <a:endParaRPr lang="en-US" dirty="0"/>
+          </a:p>
+        </p:txBody>
+      </p:sp>
+      <p:sp>
+        <p:nvSpPr>
+          <p:cNvPr id="6" name="Rectangle 5">
+            <a:extLst>
+              <a:ext uri="{FF2B5EF4-FFF2-40B4-BE49-F238E27FC236}">
+                <a16:creationId xmlns:a16="http://schemas.microsoft.com/office/drawing/2014/main" id="{9B0CA9D6-D2B3-4227-894C-B365F259EA79}"/>
+              </a:ext>
+            </a:extLst>
+          </p:cNvPr>
+          <p:cNvSpPr/>
+          <p:nvPr/>
+        </p:nvSpPr>
+        <p:spPr>
+          <a:xfrm>
+            <a:off x="1066799" y="5753741"/>
+            <a:ext cx="10058399" cy="646331"/>
+          </a:xfrm>
+          <a:prstGeom prst="rect">
+            <a:avLst/>
+          </a:prstGeom>
+        </p:spPr>
+        <p:txBody>
+          <a:bodyPr wrap="square">
+            <a:spAutoFit/>
+          </a:bodyPr>
+          <a:lstStyle/>
+          <a:p>
+            <a:r>
+              <a:rPr lang="en-US" b="1" dirty="0"/>
+              <a:t>Source</a:t>
+            </a:r>
+          </a:p>
+          <a:p>
+            <a:r>
+              <a:rPr lang="en-US">
+                <a:hlinkClick r:id="rId3"/>
+              </a:rPr>
+              <a:t>https://developer.mozilla.org/en-US/docs/Web/HTML/Block-level_elements</a:t>
+            </a:r>
+            <a:endParaRPr lang="en-US"/>
           </a:p>
         </p:txBody>
       </p:sp>
@@ -7331,10 +9207,17 @@
           <a:p>
             <a:pPr marL="468630" indent="-285750"/>
             <a:r>
+              <a:rPr lang="en-US" sz="2400" b="1" dirty="0">
+                <a:cs typeface="Arial" panose="020B0604020202020204" pitchFamily="34" charset="0"/>
+                <a:hlinkClick r:id="rId3"/>
+              </a:rPr>
+              <a:t>Inline elements</a:t>
+            </a:r>
+            <a:r>
               <a:rPr lang="en-US" sz="2400" dirty="0">
                 <a:cs typeface="Arial" panose="020B0604020202020204" pitchFamily="34" charset="0"/>
               </a:rPr>
-              <a:t>Inline elements are those which only occupy the space bounded by the tags defining the element, instead of breaking the flow of the content</a:t>
+              <a:t> are those which only occupy the space bounded by the tags defining the element, instead of breaking the flow of the content</a:t>
             </a:r>
             <a:r>
               <a:rPr lang="en-US" sz="2400">
@@ -7439,6 +9322,49 @@
               <a:t>17</a:t>
             </a:fld>
             <a:endParaRPr lang="en-US" dirty="0"/>
+          </a:p>
+        </p:txBody>
+      </p:sp>
+      <p:sp>
+        <p:nvSpPr>
+          <p:cNvPr id="5" name="Rectangle 4">
+            <a:extLst>
+              <a:ext uri="{FF2B5EF4-FFF2-40B4-BE49-F238E27FC236}">
+                <a16:creationId xmlns:a16="http://schemas.microsoft.com/office/drawing/2014/main" id="{C74CA859-7B65-460E-8A50-0BD94A6016EE}"/>
+              </a:ext>
+            </a:extLst>
+          </p:cNvPr>
+          <p:cNvSpPr/>
+          <p:nvPr/>
+        </p:nvSpPr>
+        <p:spPr>
+          <a:xfrm>
+            <a:off x="1066799" y="5753741"/>
+            <a:ext cx="10058399" cy="646331"/>
+          </a:xfrm>
+          <a:prstGeom prst="rect">
+            <a:avLst/>
+          </a:prstGeom>
+        </p:spPr>
+        <p:txBody>
+          <a:bodyPr wrap="square">
+            <a:spAutoFit/>
+          </a:bodyPr>
+          <a:lstStyle/>
+          <a:p>
+            <a:r>
+              <a:rPr lang="en-US" b="1"/>
+              <a:t>Source</a:t>
+            </a:r>
+          </a:p>
+          <a:p>
+            <a:r>
+              <a:rPr lang="en-US">
+                <a:hlinkClick r:id="rId3"/>
+              </a:rPr>
+              <a:t>https://developer.mozilla.org/en-US/docs/Web/HTML/Inline_elements</a:t>
+            </a:r>
+            <a:endParaRPr lang="en-US"/>
           </a:p>
         </p:txBody>
       </p:sp>
@@ -7558,7 +9484,7 @@
                 </a:solidFill>
                 <a:latin typeface="Consolas" panose="020B0609020204030204" pitchFamily="49" charset="0"/>
                 <a:cs typeface="Arial" panose="020B0604020202020204" pitchFamily="34" charset="0"/>
-                <a:hlinkClick r:id="rId2">
+                <a:hlinkClick r:id="rId3">
                   <a:extLst>
                     <a:ext uri="{A12FA001-AC4F-418D-AE19-62706E023703}">
                       <ahyp:hlinkClr xmlns:ahyp="http://schemas.microsoft.com/office/drawing/2018/hyperlinkcolor" val="tx"/>
@@ -7711,7 +9637,7 @@
                 <a:solidFill>
                   <a:srgbClr val="00B0F0"/>
                 </a:solidFill>
-                <a:hlinkClick r:id="rId2">
+                <a:hlinkClick r:id="rId3">
                   <a:extLst>
                     <a:ext uri="{A12FA001-AC4F-418D-AE19-62706E023703}">
                       <ahyp:hlinkClr xmlns:ahyp="http://schemas.microsoft.com/office/drawing/2018/hyperlinkcolor" val="tx"/>
@@ -7837,7 +9763,7 @@
               <a:rPr lang="en-US" sz="2000" b="1">
                 <a:latin typeface="Consolas" panose="020B0609020204030204" pitchFamily="49" charset="0"/>
                 <a:cs typeface="Arial" panose="020B0604020202020204" pitchFamily="34" charset="0"/>
-                <a:hlinkClick r:id="rId2"/>
+                <a:hlinkClick r:id="rId3"/>
               </a:rPr>
               <a:t>&lt;p&gt;</a:t>
             </a:r>
@@ -8093,7 +10019,7 @@
                 <a:solidFill>
                   <a:srgbClr val="00B0F0"/>
                 </a:solidFill>
-                <a:hlinkClick r:id="rId3">
+                <a:hlinkClick r:id="rId4">
                   <a:extLst>
                     <a:ext uri="{A12FA001-AC4F-418D-AE19-62706E023703}">
                       <ahyp:hlinkClr xmlns:ahyp="http://schemas.microsoft.com/office/drawing/2018/hyperlinkcolor" val="tx"/>
@@ -8389,7 +10315,7 @@
               <a:rPr lang="en-US" sz="1800" b="1" dirty="0">
                 <a:latin typeface="Consolas" panose="020B0609020204030204" pitchFamily="49" charset="0"/>
                 <a:cs typeface="Arial" panose="020B0604020202020204" pitchFamily="34" charset="0"/>
-                <a:hlinkClick r:id="rId2"/>
+                <a:hlinkClick r:id="rId3"/>
               </a:rPr>
               <a:t>&lt;ol&gt;</a:t>
             </a:r>
@@ -8576,7 +10502,7 @@
                 <a:solidFill>
                   <a:srgbClr val="00B0F0"/>
                 </a:solidFill>
-                <a:hlinkClick r:id="rId2">
+                <a:hlinkClick r:id="rId3">
                   <a:extLst>
                     <a:ext uri="{A12FA001-AC4F-418D-AE19-62706E023703}">
                       <ahyp:hlinkClr xmlns:ahyp="http://schemas.microsoft.com/office/drawing/2018/hyperlinkcolor" val="tx"/>
@@ -8591,7 +10517,7 @@
                 <a:solidFill>
                   <a:srgbClr val="00B0F0"/>
                 </a:solidFill>
-                <a:hlinkClick r:id="rId2">
+                <a:hlinkClick r:id="rId3">
                   <a:extLst>
                     <a:ext uri="{A12FA001-AC4F-418D-AE19-62706E023703}">
                       <ahyp:hlinkClr xmlns:ahyp="http://schemas.microsoft.com/office/drawing/2018/hyperlinkcolor" val="tx"/>
@@ -8706,7 +10632,7 @@
               <a:rPr lang="en-US" sz="1800" b="1" dirty="0">
                 <a:latin typeface="Consolas" panose="020B0609020204030204" pitchFamily="49" charset="0"/>
                 <a:cs typeface="Arial" panose="020B0604020202020204" pitchFamily="34" charset="0"/>
-                <a:hlinkClick r:id="rId2"/>
+                <a:hlinkClick r:id="rId3"/>
               </a:rPr>
               <a:t>&lt;ul&gt;</a:t>
             </a:r>
@@ -8861,7 +10787,7 @@
                 <a:solidFill>
                   <a:srgbClr val="00B0F0"/>
                 </a:solidFill>
-                <a:hlinkClick r:id="rId2">
+                <a:hlinkClick r:id="rId3">
                   <a:extLst>
                     <a:ext uri="{A12FA001-AC4F-418D-AE19-62706E023703}">
                       <ahyp:hlinkClr xmlns:ahyp="http://schemas.microsoft.com/office/drawing/2018/hyperlinkcolor" val="tx"/>
@@ -8876,7 +10802,7 @@
                 <a:solidFill>
                   <a:srgbClr val="00B0F0"/>
                 </a:solidFill>
-                <a:hlinkClick r:id="rId2">
+                <a:hlinkClick r:id="rId3">
                   <a:extLst>
                     <a:ext uri="{A12FA001-AC4F-418D-AE19-62706E023703}">
                       <ahyp:hlinkClr xmlns:ahyp="http://schemas.microsoft.com/office/drawing/2018/hyperlinkcolor" val="tx"/>
@@ -9134,7 +11060,7 @@
               <a:rPr lang="en-US" sz="1800" b="1" dirty="0">
                 <a:latin typeface="Consolas" panose="020B0609020204030204" pitchFamily="49" charset="0"/>
                 <a:cs typeface="Arial" panose="020B0604020202020204" pitchFamily="34" charset="0"/>
-                <a:hlinkClick r:id="rId2"/>
+                <a:hlinkClick r:id="rId3"/>
               </a:rPr>
               <a:t>&lt;form&gt;</a:t>
             </a:r>
@@ -9317,7 +11243,7 @@
                 <a:solidFill>
                   <a:srgbClr val="00B0F0"/>
                 </a:solidFill>
-                <a:hlinkClick r:id="rId2">
+                <a:hlinkClick r:id="rId3">
                   <a:extLst>
                     <a:ext uri="{A12FA001-AC4F-418D-AE19-62706E023703}">
                       <ahyp:hlinkClr xmlns:ahyp="http://schemas.microsoft.com/office/drawing/2018/hyperlinkcolor" val="tx"/>
@@ -9332,7 +11258,7 @@
                 <a:solidFill>
                   <a:srgbClr val="00B0F0"/>
                 </a:solidFill>
-                <a:hlinkClick r:id="rId2">
+                <a:hlinkClick r:id="rId3">
                   <a:extLst>
                     <a:ext uri="{A12FA001-AC4F-418D-AE19-62706E023703}">
                       <ahyp:hlinkClr xmlns:ahyp="http://schemas.microsoft.com/office/drawing/2018/hyperlinkcolor" val="tx"/>
@@ -10824,7 +12750,7 @@
                 <a:solidFill>
                   <a:srgbClr val="00B0F0"/>
                 </a:solidFill>
-                <a:hlinkClick r:id="rId2">
+                <a:hlinkClick r:id="rId3">
                   <a:extLst>
                     <a:ext uri="{A12FA001-AC4F-418D-AE19-62706E023703}">
                       <ahyp:hlinkClr xmlns:ahyp="http://schemas.microsoft.com/office/drawing/2018/hyperlinkcolor" val="tx"/>
@@ -11383,7 +13309,7 @@
                 </a:solidFill>
                 <a:latin typeface="Consolas" panose="020B0609020204030204" pitchFamily="49" charset="0"/>
                 <a:cs typeface="Arial" panose="020B0604020202020204" pitchFamily="34" charset="0"/>
-                <a:hlinkClick r:id="rId2">
+                <a:hlinkClick r:id="rId3">
                   <a:extLst>
                     <a:ext uri="{A12FA001-AC4F-418D-AE19-62706E023703}">
                       <ahyp:hlinkClr xmlns:ahyp="http://schemas.microsoft.com/office/drawing/2018/hyperlinkcolor" val="tx"/>
@@ -11516,7 +13442,7 @@
                 <a:solidFill>
                   <a:srgbClr val="00B0F0"/>
                 </a:solidFill>
-                <a:hlinkClick r:id="rId2">
+                <a:hlinkClick r:id="rId3">
                   <a:extLst>
                     <a:ext uri="{A12FA001-AC4F-418D-AE19-62706E023703}">
                       <ahyp:hlinkClr xmlns:ahyp="http://schemas.microsoft.com/office/drawing/2018/hyperlinkcolor" val="tx"/>
@@ -11531,7 +13457,7 @@
                 <a:solidFill>
                   <a:srgbClr val="00B0F0"/>
                 </a:solidFill>
-                <a:hlinkClick r:id="rId2">
+                <a:hlinkClick r:id="rId3">
                   <a:extLst>
                     <a:ext uri="{A12FA001-AC4F-418D-AE19-62706E023703}">
                       <ahyp:hlinkClr xmlns:ahyp="http://schemas.microsoft.com/office/drawing/2018/hyperlinkcolor" val="tx"/>
@@ -11664,7 +13590,7 @@
                   <a:srgbClr val="00B0F0"/>
                 </a:solidFill>
                 <a:latin typeface="Consolas" panose="020B0609020204030204" pitchFamily="49" charset="0"/>
-                <a:hlinkClick r:id="rId2">
+                <a:hlinkClick r:id="rId3">
                   <a:extLst>
                     <a:ext uri="{A12FA001-AC4F-418D-AE19-62706E023703}">
                       <ahyp:hlinkClr xmlns:ahyp="http://schemas.microsoft.com/office/drawing/2018/hyperlinkcolor" val="tx"/>
@@ -11776,28 +13702,6 @@
           <a:p>
             <a:r>
               <a:rPr lang="en-US">
-                <a:solidFill>
-                  <a:srgbClr val="00B0F0"/>
-                </a:solidFill>
-                <a:hlinkClick r:id="rId2">
-                  <a:extLst>
-                    <a:ext uri="{A12FA001-AC4F-418D-AE19-62706E023703}">
-                      <ahyp:hlinkClr xmlns:ahyp="http://schemas.microsoft.com/office/drawing/2018/hyperlinkcolor" val="tx"/>
-                    </a:ext>
-                  </a:extLst>
-                </a:hlinkClick>
-              </a:rPr>
-              <a:t>https://developer.mozilla.org/en-US/docs/Web/HTML/Element/html</a:t>
-            </a:r>
-            <a:endParaRPr lang="en-US" b="1" dirty="0">
-              <a:solidFill>
-                <a:srgbClr val="00B0F0"/>
-              </a:solidFill>
-            </a:endParaRPr>
-          </a:p>
-          <a:p>
-            <a:r>
-              <a:rPr lang="en-US" dirty="0">
                 <a:solidFill>
                   <a:srgbClr val="00B0F0"/>
                 </a:solidFill>
@@ -11809,6 +13713,28 @@
                   </a:extLst>
                 </a:hlinkClick>
               </a:rPr>
+              <a:t>https://developer.mozilla.org/en-US/docs/Web/HTML/Element/html</a:t>
+            </a:r>
+            <a:endParaRPr lang="en-US" b="1" dirty="0">
+              <a:solidFill>
+                <a:srgbClr val="00B0F0"/>
+              </a:solidFill>
+            </a:endParaRPr>
+          </a:p>
+          <a:p>
+            <a:r>
+              <a:rPr lang="en-US" dirty="0">
+                <a:solidFill>
+                  <a:srgbClr val="00B0F0"/>
+                </a:solidFill>
+                <a:hlinkClick r:id="rId4">
+                  <a:extLst>
+                    <a:ext uri="{A12FA001-AC4F-418D-AE19-62706E023703}">
+                      <ahyp:hlinkClr xmlns:ahyp="http://schemas.microsoft.com/office/drawing/2018/hyperlinkcolor" val="tx"/>
+                    </a:ext>
+                  </a:extLst>
+                </a:hlinkClick>
+              </a:rPr>
               <a:t>https://www.w3schools.com/Tags/tag_html</a:t>
             </a:r>
             <a:r>
@@ -11816,7 +13742,7 @@
                 <a:solidFill>
                   <a:srgbClr val="00B0F0"/>
                 </a:solidFill>
-                <a:hlinkClick r:id="rId3">
+                <a:hlinkClick r:id="rId4">
                   <a:extLst>
                     <a:ext uri="{A12FA001-AC4F-418D-AE19-62706E023703}">
                       <ahyp:hlinkClr xmlns:ahyp="http://schemas.microsoft.com/office/drawing/2018/hyperlinkcolor" val="tx"/>
@@ -11946,7 +13872,7 @@
                   <a:srgbClr val="00B0F0"/>
                 </a:solidFill>
                 <a:latin typeface="Consolas" panose="020B0609020204030204" pitchFamily="49" charset="0"/>
-                <a:hlinkClick r:id="rId2">
+                <a:hlinkClick r:id="rId3">
                   <a:extLst>
                     <a:ext uri="{A12FA001-AC4F-418D-AE19-62706E023703}">
                       <ahyp:hlinkClr xmlns:ahyp="http://schemas.microsoft.com/office/drawing/2018/hyperlinkcolor" val="tx"/>
@@ -12019,7 +13945,7 @@
                 <a:solidFill>
                   <a:srgbClr val="00B0F0"/>
                 </a:solidFill>
-                <a:hlinkClick r:id="rId2"/>
+                <a:hlinkClick r:id="rId3"/>
               </a:rPr>
               <a:t>https://developer.mozilla.org/en-US/docs/Web/HTML/Element</a:t>
             </a:r>
@@ -12028,7 +13954,7 @@
                 <a:solidFill>
                   <a:srgbClr val="00B0F0"/>
                 </a:solidFill>
-                <a:hlinkClick r:id="rId2"/>
+                <a:hlinkClick r:id="rId3"/>
               </a:rPr>
               <a:t>/head</a:t>
             </a:r>
@@ -12145,7 +14071,7 @@
             <a:r>
               <a:rPr lang="en-US" sz="1900" b="1">
                 <a:cs typeface="Arial" panose="020B0604020202020204" pitchFamily="34" charset="0"/>
-                <a:hlinkClick r:id="rId2"/>
+                <a:hlinkClick r:id="rId3"/>
               </a:rPr>
               <a:t>&lt;meta&gt;</a:t>
             </a:r>
@@ -12367,7 +14293,7 @@
           <a:p>
             <a:r>
               <a:rPr lang="en-US">
-                <a:hlinkClick r:id="rId2"/>
+                <a:hlinkClick r:id="rId3"/>
               </a:rPr>
               <a:t>https://developer.mozilla.org/en-US/docs/Web/HTML/Element/meta</a:t>
             </a:r>
@@ -12930,15 +14856,6 @@
 </file>
 
 <file path=customXml/item1.xml><?xml version="1.0" encoding="utf-8"?>
-<?mso-contentType ?>
-<FormTemplates xmlns="http://schemas.microsoft.com/sharepoint/v3/contenttype/forms">
-  <Display>DocumentLibraryForm</Display>
-  <Edit>DocumentLibraryForm</Edit>
-  <New>DocumentLibraryForm</New>
-</FormTemplates>
-</file>
-
-<file path=customXml/item2.xml><?xml version="1.0" encoding="utf-8"?>
 <ct:contentTypeSchema xmlns:ct="http://schemas.microsoft.com/office/2006/metadata/contentType" xmlns:ma="http://schemas.microsoft.com/office/2006/metadata/properties/metaAttributes" ct:_="" ma:_="" ma:contentTypeName="Document" ma:contentTypeID="0x01010079F111ED35F8CC479449609E8A0923A6" ma:contentTypeVersion="12" ma:contentTypeDescription="Create a new document." ma:contentTypeScope="" ma:versionID="a410dd7f93c95333ffa1b60ed6adedd1">
   <xsd:schema xmlns:xsd="http://www.w3.org/2001/XMLSchema" xmlns:xs="http://www.w3.org/2001/XMLSchema" xmlns:p="http://schemas.microsoft.com/office/2006/metadata/properties" xmlns:ns2="71af3243-3dd4-4a8d-8c0d-dd76da1f02a5" xmlns:ns3="16c05727-aa75-4e4a-9b5f-8a80a1165891" targetNamespace="http://schemas.microsoft.com/office/2006/metadata/properties" ma:root="true" ma:fieldsID="a936d9baba76aa3866493feff160faab" ns2:_="" ns3:_="">
     <xsd:import namespace="71af3243-3dd4-4a8d-8c0d-dd76da1f02a5"/>
@@ -13159,6 +15076,15 @@
 </ct:contentTypeSchema>
 </file>
 
+<file path=customXml/item2.xml><?xml version="1.0" encoding="utf-8"?>
+<?mso-contentType ?>
+<FormTemplates xmlns="http://schemas.microsoft.com/sharepoint/v3/contenttype/forms">
+  <Display>DocumentLibraryForm</Display>
+  <Edit>DocumentLibraryForm</Edit>
+  <New>DocumentLibraryForm</New>
+</FormTemplates>
+</file>
+
 <file path=customXml/item3.xml><?xml version="1.0" encoding="utf-8"?>
 <p:properties xmlns:p="http://schemas.microsoft.com/office/2006/metadata/properties" xmlns:xsi="http://www.w3.org/2001/XMLSchema-instance" xmlns:pc="http://schemas.microsoft.com/office/infopath/2007/PartnerControls">
   <documentManagement>
@@ -13169,14 +15095,6 @@
 </file>
 
 <file path=customXml/itemProps1.xml><?xml version="1.0" encoding="utf-8"?>
-<ds:datastoreItem xmlns:ds="http://schemas.openxmlformats.org/officeDocument/2006/customXml" ds:itemID="{CDB58277-F8DF-46FF-84EC-EF41B835E69F}">
-  <ds:schemaRefs>
-    <ds:schemaRef ds:uri="http://schemas.microsoft.com/sharepoint/v3/contenttype/forms"/>
-  </ds:schemaRefs>
-</ds:datastoreItem>
-</file>
-
-<file path=customXml/itemProps2.xml><?xml version="1.0" encoding="utf-8"?>
 <ds:datastoreItem xmlns:ds="http://schemas.openxmlformats.org/officeDocument/2006/customXml" ds:itemID="{2D276E62-80A3-44DD-9BCC-97ED2B99B57F}">
   <ds:schemaRefs>
     <ds:schemaRef ds:uri="http://schemas.microsoft.com/office/2006/metadata/contentType"/>
@@ -13191,6 +15109,14 @@
     <ds:schemaRef ds:uri="http://purl.org/dc/elements/1.1/"/>
     <ds:schemaRef ds:uri="http://purl.org/dc/terms/"/>
     <ds:schemaRef ds:uri="http://schemas.microsoft.com/internal/obd"/>
+  </ds:schemaRefs>
+</ds:datastoreItem>
+</file>
+
+<file path=customXml/itemProps2.xml><?xml version="1.0" encoding="utf-8"?>
+<ds:datastoreItem xmlns:ds="http://schemas.openxmlformats.org/officeDocument/2006/customXml" ds:itemID="{CDB58277-F8DF-46FF-84EC-EF41B835E69F}">
+  <ds:schemaRefs>
+    <ds:schemaRef ds:uri="http://schemas.microsoft.com/sharepoint/v3/contenttype/forms"/>
   </ds:schemaRefs>
 </ds:datastoreItem>
 </file>

</xml_diff>